<commit_message>
updated PDF, Word and PPT files
</commit_message>
<xml_diff>
--- a/02/02_eloadas_HTTP_mukodese.pptx
+++ b/02/02_eloadas_HTTP_mukodese.pptx
@@ -5,29 +5,30 @@
     <p:sldMasterId id="2147483648" r:id="rId1"/>
   </p:sldMasterIdLst>
   <p:notesMasterIdLst>
-    <p:notesMasterId r:id="rId22"/>
+    <p:notesMasterId r:id="rId23"/>
   </p:notesMasterIdLst>
   <p:sldIdLst>
-    <p:sldId id="256" r:id="rId2"/>
-    <p:sldId id="257" r:id="rId3"/>
-    <p:sldId id="258" r:id="rId4"/>
-    <p:sldId id="259" r:id="rId5"/>
-    <p:sldId id="260" r:id="rId6"/>
-    <p:sldId id="261" r:id="rId7"/>
-    <p:sldId id="262" r:id="rId8"/>
-    <p:sldId id="263" r:id="rId9"/>
-    <p:sldId id="264" r:id="rId10"/>
-    <p:sldId id="265" r:id="rId11"/>
-    <p:sldId id="266" r:id="rId12"/>
-    <p:sldId id="268" r:id="rId13"/>
-    <p:sldId id="271" r:id="rId14"/>
-    <p:sldId id="272" r:id="rId15"/>
-    <p:sldId id="273" r:id="rId16"/>
-    <p:sldId id="275" r:id="rId17"/>
-    <p:sldId id="279" r:id="rId18"/>
-    <p:sldId id="276" r:id="rId19"/>
-    <p:sldId id="277" r:id="rId20"/>
-    <p:sldId id="278" r:id="rId21"/>
+    <p:sldId id="280" r:id="rId2"/>
+    <p:sldId id="256" r:id="rId3"/>
+    <p:sldId id="257" r:id="rId4"/>
+    <p:sldId id="258" r:id="rId5"/>
+    <p:sldId id="259" r:id="rId6"/>
+    <p:sldId id="260" r:id="rId7"/>
+    <p:sldId id="261" r:id="rId8"/>
+    <p:sldId id="262" r:id="rId9"/>
+    <p:sldId id="263" r:id="rId10"/>
+    <p:sldId id="264" r:id="rId11"/>
+    <p:sldId id="265" r:id="rId12"/>
+    <p:sldId id="266" r:id="rId13"/>
+    <p:sldId id="268" r:id="rId14"/>
+    <p:sldId id="271" r:id="rId15"/>
+    <p:sldId id="272" r:id="rId16"/>
+    <p:sldId id="273" r:id="rId17"/>
+    <p:sldId id="275" r:id="rId18"/>
+    <p:sldId id="279" r:id="rId19"/>
+    <p:sldId id="276" r:id="rId20"/>
+    <p:sldId id="277" r:id="rId21"/>
+    <p:sldId id="278" r:id="rId22"/>
   </p:sldIdLst>
   <p:sldSz cx="9144000" cy="6858000" type="screen4x3"/>
   <p:notesSz cx="6858000" cy="9144000"/>
@@ -11414,7 +11415,7 @@
           <a:p>
             <a:fld id="{5BCAD085-E8A6-8845-BD4E-CB4CCA059FC4}" type="datetimeFigureOut">
               <a:rPr lang="en-US" smtClean="0"/>
-              <a:t>2/15/2026</a:t>
+              <a:t>2/16/2026</a:t>
             </a:fld>
             <a:endParaRPr lang="en-US"/>
           </a:p>
@@ -11582,7 +11583,7 @@
           <a:p>
             <a:fld id="{5BCAD085-E8A6-8845-BD4E-CB4CCA059FC4}" type="datetimeFigureOut">
               <a:rPr lang="en-US" smtClean="0"/>
-              <a:t>2/15/2026</a:t>
+              <a:t>2/16/2026</a:t>
             </a:fld>
             <a:endParaRPr lang="en-US"/>
           </a:p>
@@ -11760,7 +11761,7 @@
           <a:p>
             <a:fld id="{5BCAD085-E8A6-8845-BD4E-CB4CCA059FC4}" type="datetimeFigureOut">
               <a:rPr lang="en-US" smtClean="0"/>
-              <a:t>2/15/2026</a:t>
+              <a:t>2/16/2026</a:t>
             </a:fld>
             <a:endParaRPr lang="en-US"/>
           </a:p>
@@ -11928,7 +11929,7 @@
           <a:p>
             <a:fld id="{5BCAD085-E8A6-8845-BD4E-CB4CCA059FC4}" type="datetimeFigureOut">
               <a:rPr lang="en-US" smtClean="0"/>
-              <a:t>2/15/2026</a:t>
+              <a:t>2/16/2026</a:t>
             </a:fld>
             <a:endParaRPr lang="en-US"/>
           </a:p>
@@ -12173,7 +12174,7 @@
           <a:p>
             <a:fld id="{5BCAD085-E8A6-8845-BD4E-CB4CCA059FC4}" type="datetimeFigureOut">
               <a:rPr lang="en-US" smtClean="0"/>
-              <a:t>2/15/2026</a:t>
+              <a:t>2/16/2026</a:t>
             </a:fld>
             <a:endParaRPr lang="en-US"/>
           </a:p>
@@ -12458,7 +12459,7 @@
           <a:p>
             <a:fld id="{5BCAD085-E8A6-8845-BD4E-CB4CCA059FC4}" type="datetimeFigureOut">
               <a:rPr lang="en-US" smtClean="0"/>
-              <a:t>2/15/2026</a:t>
+              <a:t>2/16/2026</a:t>
             </a:fld>
             <a:endParaRPr lang="en-US"/>
           </a:p>
@@ -12877,7 +12878,7 @@
           <a:p>
             <a:fld id="{5BCAD085-E8A6-8845-BD4E-CB4CCA059FC4}" type="datetimeFigureOut">
               <a:rPr lang="en-US" smtClean="0"/>
-              <a:t>2/15/2026</a:t>
+              <a:t>2/16/2026</a:t>
             </a:fld>
             <a:endParaRPr lang="en-US"/>
           </a:p>
@@ -12994,7 +12995,7 @@
           <a:p>
             <a:fld id="{5BCAD085-E8A6-8845-BD4E-CB4CCA059FC4}" type="datetimeFigureOut">
               <a:rPr lang="en-US" smtClean="0"/>
-              <a:t>2/15/2026</a:t>
+              <a:t>2/16/2026</a:t>
             </a:fld>
             <a:endParaRPr lang="en-US"/>
           </a:p>
@@ -13089,7 +13090,7 @@
           <a:p>
             <a:fld id="{5BCAD085-E8A6-8845-BD4E-CB4CCA059FC4}" type="datetimeFigureOut">
               <a:rPr lang="en-US" smtClean="0"/>
-              <a:t>2/15/2026</a:t>
+              <a:t>2/16/2026</a:t>
             </a:fld>
             <a:endParaRPr lang="en-US"/>
           </a:p>
@@ -13364,7 +13365,7 @@
           <a:p>
             <a:fld id="{5BCAD085-E8A6-8845-BD4E-CB4CCA059FC4}" type="datetimeFigureOut">
               <a:rPr lang="en-US" smtClean="0"/>
-              <a:t>2/15/2026</a:t>
+              <a:t>2/16/2026</a:t>
             </a:fld>
             <a:endParaRPr lang="en-US"/>
           </a:p>
@@ -13616,7 +13617,7 @@
           <a:p>
             <a:fld id="{5BCAD085-E8A6-8845-BD4E-CB4CCA059FC4}" type="datetimeFigureOut">
               <a:rPr lang="en-US" smtClean="0"/>
-              <a:t>2/15/2026</a:t>
+              <a:t>2/16/2026</a:t>
             </a:fld>
             <a:endParaRPr lang="en-US"/>
           </a:p>
@@ -13827,7 +13828,7 @@
           <a:p>
             <a:fld id="{5BCAD085-E8A6-8845-BD4E-CB4CCA059FC4}" type="datetimeFigureOut">
               <a:rPr lang="en-US" smtClean="0"/>
-              <a:t>2/15/2026</a:t>
+              <a:t>2/16/2026</a:t>
             </a:fld>
             <a:endParaRPr lang="en-US"/>
           </a:p>
@@ -14188,14 +14189,6 @@
 <file path=ppt/slides/slide1.xml><?xml version="1.0" encoding="utf-8"?>
 <p:sld xmlns:a="http://schemas.openxmlformats.org/drawingml/2006/main" xmlns:r="http://schemas.openxmlformats.org/officeDocument/2006/relationships" xmlns:p="http://schemas.openxmlformats.org/presentationml/2006/main">
   <p:cSld>
-    <p:bg>
-      <p:bgPr>
-        <a:solidFill>
-          <a:schemeClr val="bg1"/>
-        </a:solidFill>
-        <a:effectLst/>
-      </p:bgPr>
-    </p:bg>
     <p:spTree>
       <p:nvGrpSpPr>
         <p:cNvPr id="1" name=""/>
@@ -14210,209 +14203,15 @@
           <a:chExt cx="0" cy="0"/>
         </a:xfrm>
       </p:grpSpPr>
-      <p:sp useBgFill="1">
+      <p:sp>
         <p:nvSpPr>
-          <p:cNvPr id="15" name="Rectangle 14">
+          <p:cNvPr id="2" name="Title 1">
             <a:extLst>
               <a:ext uri="{FF2B5EF4-FFF2-40B4-BE49-F238E27FC236}">
-                <a16:creationId xmlns:a16="http://schemas.microsoft.com/office/drawing/2014/main" id="{9DBC8166-481C-4473-95F5-9A5B9073B7F1}"/>
-              </a:ext>
-              <a:ext uri="{C183D7F6-B498-43B3-948B-1728B52AA6E4}">
-                <adec:decorative xmlns:adec="http://schemas.microsoft.com/office/drawing/2017/decorative" val="1"/>
+                <a16:creationId xmlns:a16="http://schemas.microsoft.com/office/drawing/2014/main" id="{0A8888D9-8305-0465-4F3D-7DA298735475}"/>
               </a:ext>
             </a:extLst>
           </p:cNvPr>
-          <p:cNvSpPr>
-            <a:spLocks noGrp="1" noRot="1" noChangeAspect="1" noMove="1" noResize="1" noEditPoints="1" noAdjustHandles="1" noChangeArrowheads="1" noChangeShapeType="1" noTextEdit="1"/>
-          </p:cNvSpPr>
-          <p:nvPr>
-            <p:extLst>
-              <p:ext uri="{386F3935-93C4-4BCD-93E2-E3B085C9AB24}">
-                <p16:designElem xmlns:p16="http://schemas.microsoft.com/office/powerpoint/2015/main" val="1"/>
-              </p:ext>
-            </p:extLst>
-          </p:nvPr>
-        </p:nvSpPr>
-        <p:spPr>
-          <a:xfrm>
-            <a:off x="0" y="0"/>
-            <a:ext cx="9141714" cy="6858000"/>
-          </a:xfrm>
-          <a:prstGeom prst="rect">
-            <a:avLst/>
-          </a:prstGeom>
-          <a:ln>
-            <a:noFill/>
-          </a:ln>
-        </p:spPr>
-        <p:style>
-          <a:lnRef idx="2">
-            <a:schemeClr val="accent1">
-              <a:shade val="50000"/>
-            </a:schemeClr>
-          </a:lnRef>
-          <a:fillRef idx="1">
-            <a:schemeClr val="accent1"/>
-          </a:fillRef>
-          <a:effectRef idx="0">
-            <a:schemeClr val="accent1"/>
-          </a:effectRef>
-          <a:fontRef idx="minor">
-            <a:schemeClr val="lt1"/>
-          </a:fontRef>
-        </p:style>
-        <p:txBody>
-          <a:bodyPr rtlCol="0" anchor="ctr"/>
-          <a:lstStyle/>
-          <a:p>
-            <a:pPr algn="ctr"/>
-            <a:endParaRPr lang="en-US"/>
-          </a:p>
-        </p:txBody>
-      </p:sp>
-      <p:sp>
-        <p:nvSpPr>
-          <p:cNvPr id="17" name="Freeform: Shape 16">
-            <a:extLst>
-              <a:ext uri="{FF2B5EF4-FFF2-40B4-BE49-F238E27FC236}">
-                <a16:creationId xmlns:a16="http://schemas.microsoft.com/office/drawing/2014/main" id="{A5A5CE6E-90AF-4D43-A014-1F9EC83EB93D}"/>
-              </a:ext>
-              <a:ext uri="{C183D7F6-B498-43B3-948B-1728B52AA6E4}">
-                <adec:decorative xmlns:adec="http://schemas.microsoft.com/office/drawing/2017/decorative" val="1"/>
-              </a:ext>
-            </a:extLst>
-          </p:cNvPr>
-          <p:cNvSpPr>
-            <a:spLocks noGrp="1" noRot="1" noChangeAspect="1" noMove="1" noResize="1" noEditPoints="1" noAdjustHandles="1" noChangeArrowheads="1" noChangeShapeType="1" noTextEdit="1"/>
-          </p:cNvSpPr>
-          <p:nvPr>
-            <p:extLst>
-              <p:ext uri="{386F3935-93C4-4BCD-93E2-E3B085C9AB24}">
-                <p16:designElem xmlns:p16="http://schemas.microsoft.com/office/powerpoint/2015/main" val="1"/>
-              </p:ext>
-            </p:extLst>
-          </p:nvPr>
-        </p:nvSpPr>
-        <p:spPr>
-          <a:xfrm>
-            <a:off x="0" y="1"/>
-            <a:ext cx="3384350" cy="6858000"/>
-          </a:xfrm>
-          <a:custGeom>
-            <a:avLst/>
-            <a:gdLst>
-              <a:gd name="connsiteX0" fmla="*/ 0 w 4512467"/>
-              <a:gd name="connsiteY0" fmla="*/ 0 h 6858000"/>
-              <a:gd name="connsiteX1" fmla="*/ 2579526 w 4512467"/>
-              <a:gd name="connsiteY1" fmla="*/ 0 h 6858000"/>
-              <a:gd name="connsiteX2" fmla="*/ 2583267 w 4512467"/>
-              <a:gd name="connsiteY2" fmla="*/ 2151 h 6858000"/>
-              <a:gd name="connsiteX3" fmla="*/ 4512467 w 4512467"/>
-              <a:gd name="connsiteY3" fmla="*/ 3429000 h 6858000"/>
-              <a:gd name="connsiteX4" fmla="*/ 2583267 w 4512467"/>
-              <a:gd name="connsiteY4" fmla="*/ 6855849 h 6858000"/>
-              <a:gd name="connsiteX5" fmla="*/ 2579526 w 4512467"/>
-              <a:gd name="connsiteY5" fmla="*/ 6858000 h 6858000"/>
-              <a:gd name="connsiteX6" fmla="*/ 0 w 4512467"/>
-              <a:gd name="connsiteY6" fmla="*/ 6858000 h 6858000"/>
-            </a:gdLst>
-            <a:ahLst/>
-            <a:cxnLst>
-              <a:cxn ang="0">
-                <a:pos x="connsiteX0" y="connsiteY0"/>
-              </a:cxn>
-              <a:cxn ang="0">
-                <a:pos x="connsiteX1" y="connsiteY1"/>
-              </a:cxn>
-              <a:cxn ang="0">
-                <a:pos x="connsiteX2" y="connsiteY2"/>
-              </a:cxn>
-              <a:cxn ang="0">
-                <a:pos x="connsiteX3" y="connsiteY3"/>
-              </a:cxn>
-              <a:cxn ang="0">
-                <a:pos x="connsiteX4" y="connsiteY4"/>
-              </a:cxn>
-              <a:cxn ang="0">
-                <a:pos x="connsiteX5" y="connsiteY5"/>
-              </a:cxn>
-              <a:cxn ang="0">
-                <a:pos x="connsiteX6" y="connsiteY6"/>
-              </a:cxn>
-            </a:cxnLst>
-            <a:rect l="l" t="t" r="r" b="b"/>
-            <a:pathLst>
-              <a:path w="4512467" h="6858000">
-                <a:moveTo>
-                  <a:pt x="0" y="0"/>
-                </a:moveTo>
-                <a:lnTo>
-                  <a:pt x="2579526" y="0"/>
-                </a:lnTo>
-                <a:lnTo>
-                  <a:pt x="2583267" y="2151"/>
-                </a:lnTo>
-                <a:cubicBezTo>
-                  <a:pt x="3739868" y="704919"/>
-                  <a:pt x="4512467" y="1976735"/>
-                  <a:pt x="4512467" y="3429000"/>
-                </a:cubicBezTo>
-                <a:cubicBezTo>
-                  <a:pt x="4512467" y="4881266"/>
-                  <a:pt x="3739868" y="6153081"/>
-                  <a:pt x="2583267" y="6855849"/>
-                </a:cubicBezTo>
-                <a:lnTo>
-                  <a:pt x="2579526" y="6858000"/>
-                </a:lnTo>
-                <a:lnTo>
-                  <a:pt x="0" y="6858000"/>
-                </a:lnTo>
-                <a:close/>
-              </a:path>
-            </a:pathLst>
-          </a:custGeom>
-          <a:solidFill>
-            <a:schemeClr val="accent2"/>
-          </a:solidFill>
-          <a:ln>
-            <a:noFill/>
-          </a:ln>
-        </p:spPr>
-        <p:style>
-          <a:lnRef idx="2">
-            <a:schemeClr val="accent1">
-              <a:shade val="50000"/>
-            </a:schemeClr>
-          </a:lnRef>
-          <a:fillRef idx="1">
-            <a:schemeClr val="accent1"/>
-          </a:fillRef>
-          <a:effectRef idx="0">
-            <a:schemeClr val="accent1"/>
-          </a:effectRef>
-          <a:fontRef idx="minor">
-            <a:schemeClr val="lt1"/>
-          </a:fontRef>
-        </p:style>
-        <p:txBody>
-          <a:bodyPr wrap="square" rtlCol="0" anchor="ctr">
-            <a:noAutofit/>
-          </a:bodyPr>
-          <a:lstStyle/>
-          <a:p>
-            <a:pPr algn="ctr"/>
-            <a:endParaRPr lang="en-US">
-              <a:solidFill>
-                <a:schemeClr val="bg1"/>
-              </a:solidFill>
-            </a:endParaRPr>
-          </a:p>
-        </p:txBody>
-      </p:sp>
-      <p:sp>
-        <p:nvSpPr>
-          <p:cNvPr id="2" name="Title 1"/>
           <p:cNvSpPr>
             <a:spLocks noGrp="1"/>
           </p:cNvSpPr>
@@ -14422,8 +14221,8 @@
         </p:nvSpPr>
         <p:spPr>
           <a:xfrm>
-            <a:off x="628650" y="643467"/>
-            <a:ext cx="2213403" cy="5571066"/>
+            <a:off x="390906" y="1005178"/>
+            <a:ext cx="4697730" cy="1097280"/>
           </a:xfrm>
         </p:spPr>
         <p:txBody>
@@ -14433,48 +14232,121 @@
           <a:lstStyle/>
           <a:p>
             <a:r>
-              <a:rPr lang="hu-HU" sz="3700">
-                <a:solidFill>
-                  <a:srgbClr val="FFFFFF"/>
-                </a:solidFill>
-              </a:rPr>
-              <a:t>HTTP működése – HTTP/1.1 alapjai</a:t>
-            </a:r>
+              <a:rPr lang="hu-HU" dirty="0"/>
+              <a:t>GitHub </a:t>
+            </a:r>
+            <a:r>
+              <a:rPr lang="hu-HU" dirty="0" err="1"/>
+              <a:t>repository</a:t>
+            </a:r>
+            <a:endParaRPr lang="en-US" dirty="0"/>
           </a:p>
         </p:txBody>
       </p:sp>
-      <p:graphicFrame>
-        <p:nvGraphicFramePr>
-          <p:cNvPr id="5" name="Content Placeholder 2">
+      <p:sp>
+        <p:nvSpPr>
+          <p:cNvPr id="3" name="Content Placeholder 2">
             <a:extLst>
               <a:ext uri="{FF2B5EF4-FFF2-40B4-BE49-F238E27FC236}">
-                <a16:creationId xmlns:a16="http://schemas.microsoft.com/office/drawing/2014/main" id="{5039E465-1570-FA04-7F1A-000829F5327B}"/>
+                <a16:creationId xmlns:a16="http://schemas.microsoft.com/office/drawing/2014/main" id="{B5CB6470-8D30-EA9B-70C6-C8C1DD303D15}"/>
               </a:ext>
             </a:extLst>
           </p:cNvPr>
-          <p:cNvGraphicFramePr>
-            <a:graphicFrameLocks noGrp="1"/>
-          </p:cNvGraphicFramePr>
+          <p:cNvSpPr>
+            <a:spLocks noGrp="1"/>
+          </p:cNvSpPr>
           <p:nvPr>
             <p:ph idx="1"/>
-            <p:extLst>
-              <p:ext uri="{D42A27DB-BD31-4B8C-83A1-F6EECF244321}">
-                <p14:modId xmlns:p14="http://schemas.microsoft.com/office/powerpoint/2010/main" val="4129153239"/>
-              </p:ext>
-            </p:extLst>
           </p:nvPr>
-        </p:nvGraphicFramePr>
-        <p:xfrm>
-          <a:off x="3905730" y="643466"/>
-          <a:ext cx="4718785" cy="5530735"/>
-        </p:xfrm>
-        <a:graphic>
-          <a:graphicData uri="http://schemas.openxmlformats.org/drawingml/2006/diagram">
-            <dgm:relIds xmlns:dgm="http://schemas.openxmlformats.org/drawingml/2006/diagram" xmlns:r="http://schemas.openxmlformats.org/officeDocument/2006/relationships" r:dm="rId3" r:lo="rId4" r:qs="rId5" r:cs="rId6"/>
-          </a:graphicData>
-        </a:graphic>
-      </p:graphicFrame>
+        </p:nvSpPr>
+        <p:spPr>
+          <a:xfrm>
+            <a:off x="425952" y="2478686"/>
+            <a:ext cx="5667118" cy="2825496"/>
+          </a:xfrm>
+        </p:spPr>
+        <p:txBody>
+          <a:bodyPr>
+            <a:normAutofit/>
+          </a:bodyPr>
+          <a:lstStyle/>
+          <a:p>
+            <a:pPr marL="0" indent="0">
+              <a:buNone/>
+            </a:pPr>
+            <a:r>
+              <a:rPr lang="hu-HU" sz="1800" dirty="0"/>
+              <a:t>A tantárgyhoz kapcsolódó anyagok és példaprogramok elérhetők az alábbi GitHub linken:</a:t>
+            </a:r>
+          </a:p>
+          <a:p>
+            <a:pPr marL="0" indent="0">
+              <a:buNone/>
+            </a:pPr>
+            <a:endParaRPr lang="hu-HU" dirty="0"/>
+          </a:p>
+          <a:p>
+            <a:pPr marL="0" indent="0">
+              <a:buNone/>
+            </a:pPr>
+            <a:r>
+              <a:rPr lang="hu-HU" sz="1800" dirty="0">
+                <a:hlinkClick r:id="rId2"/>
+              </a:rPr>
+              <a:t>https://github.com/zbalogh/oe-internetes-alkalmazasok</a:t>
+            </a:r>
+            <a:endParaRPr lang="hu-HU" sz="1800" dirty="0"/>
+          </a:p>
+          <a:p>
+            <a:pPr marL="0" indent="0">
+              <a:buNone/>
+            </a:pPr>
+            <a:endParaRPr lang="hu-HU" dirty="0"/>
+          </a:p>
+        </p:txBody>
+      </p:sp>
+      <p:pic>
+        <p:nvPicPr>
+          <p:cNvPr id="5" name="Picture 4">
+            <a:extLst>
+              <a:ext uri="{FF2B5EF4-FFF2-40B4-BE49-F238E27FC236}">
+                <a16:creationId xmlns:a16="http://schemas.microsoft.com/office/drawing/2014/main" id="{1D9CE131-709F-8000-6809-6F51AE690880}"/>
+              </a:ext>
+            </a:extLst>
+          </p:cNvPr>
+          <p:cNvPicPr>
+            <a:picLocks noChangeAspect="1"/>
+          </p:cNvPicPr>
+          <p:nvPr/>
+        </p:nvPicPr>
+        <p:blipFill>
+          <a:blip r:embed="rId3">
+            <a:extLst>
+              <a:ext uri="{28A0092B-C50C-407E-A947-70E740481C1C}">
+                <a14:useLocalDpi xmlns:a14="http://schemas.microsoft.com/office/drawing/2010/main" val="0"/>
+              </a:ext>
+            </a:extLst>
+          </a:blip>
+          <a:stretch>
+            <a:fillRect/>
+          </a:stretch>
+        </p:blipFill>
+        <p:spPr>
+          <a:xfrm flipH="1">
+            <a:off x="6180992" y="2290493"/>
+            <a:ext cx="2572319" cy="2572319"/>
+          </a:xfrm>
+          <a:prstGeom prst="rect">
+            <a:avLst/>
+          </a:prstGeom>
+        </p:spPr>
+      </p:pic>
     </p:spTree>
+    <p:extLst>
+      <p:ext uri="{BB962C8B-B14F-4D97-AF65-F5344CB8AC3E}">
+        <p14:creationId xmlns:p14="http://schemas.microsoft.com/office/powerpoint/2010/main" val="464779225"/>
+      </p:ext>
+    </p:extLst>
   </p:cSld>
   <p:clrMapOvr>
     <a:masterClrMapping/>
@@ -14580,7 +14452,7 @@
         <p:spPr>
           <a:xfrm>
             <a:off x="628650" y="365125"/>
-            <a:ext cx="7886700" cy="1325563"/>
+            <a:ext cx="7886700" cy="1060237"/>
           </a:xfrm>
         </p:spPr>
         <p:txBody>
@@ -14590,9 +14462,14 @@
           <a:lstStyle/>
           <a:p>
             <a:r>
-              <a:rPr lang="en-US" sz="4700"/>
-              <a:t>POST metódus</a:t>
-            </a:r>
+              <a:rPr lang="en-US" sz="4700" dirty="0"/>
+              <a:t>GET </a:t>
+            </a:r>
+            <a:r>
+              <a:rPr lang="en-US" sz="4700" dirty="0" err="1"/>
+              <a:t>metódus</a:t>
+            </a:r>
+            <a:endParaRPr lang="en-US" sz="4700" dirty="0"/>
           </a:p>
         </p:txBody>
       </p:sp>
@@ -15089,6 +14966,1029 @@
           <p:cNvPr id="4" name="Rectangle 1">
             <a:extLst>
               <a:ext uri="{FF2B5EF4-FFF2-40B4-BE49-F238E27FC236}">
+                <a16:creationId xmlns:a16="http://schemas.microsoft.com/office/drawing/2014/main" id="{6921BDFA-7C17-B4A0-A9AE-72698BD95218}"/>
+              </a:ext>
+            </a:extLst>
+          </p:cNvPr>
+          <p:cNvSpPr>
+            <a:spLocks noGrp="1" noChangeArrowheads="1"/>
+          </p:cNvSpPr>
+          <p:nvPr>
+            <p:ph idx="1"/>
+          </p:nvPr>
+        </p:nvSpPr>
+        <p:spPr bwMode="auto">
+          <a:xfrm>
+            <a:off x="628650" y="1929384"/>
+            <a:ext cx="7886700" cy="4251960"/>
+          </a:xfrm>
+          <a:prstGeom prst="rect">
+            <a:avLst/>
+          </a:prstGeom>
+          <a:extLst>
+            <a:ext uri="{909E8E84-426E-40DD-AFC4-6F175D3DCCD1}">
+              <a14:hiddenFill xmlns:a14="http://schemas.microsoft.com/office/drawing/2010/main">
+                <a:solidFill>
+                  <a:schemeClr val="accent1"/>
+                </a:solidFill>
+              </a14:hiddenFill>
+            </a:ext>
+            <a:ext uri="{91240B29-F687-4F45-9708-019B960494DF}">
+              <a14:hiddenLine xmlns:a14="http://schemas.microsoft.com/office/drawing/2010/main" w="9525">
+                <a:solidFill>
+                  <a:schemeClr val="tx1"/>
+                </a:solidFill>
+                <a:miter lim="800000"/>
+                <a:headEnd/>
+                <a:tailEnd/>
+              </a14:hiddenLine>
+            </a:ext>
+            <a:ext uri="{AF507438-7753-43E0-B8FC-AC1667EBCBE1}">
+              <a14:hiddenEffects xmlns:a14="http://schemas.microsoft.com/office/drawing/2010/main">
+                <a:effectLst>
+                  <a:outerShdw dist="35921" dir="2700000" algn="ctr" rotWithShape="0">
+                    <a:schemeClr val="bg2"/>
+                  </a:outerShdw>
+                </a:effectLst>
+              </a14:hiddenEffects>
+            </a:ext>
+          </a:extLst>
+        </p:spPr>
+        <p:txBody>
+          <a:bodyPr vert="horz" lIns="91440" tIns="45720" rIns="91440" bIns="45720" numCol="1" anchorCtr="0" compatLnSpc="1">
+            <a:prstTxWarp prst="textNoShape">
+              <a:avLst/>
+            </a:prstTxWarp>
+            <a:normAutofit/>
+          </a:bodyPr>
+          <a:lstStyle/>
+          <a:p>
+            <a:pPr marL="0" marR="0" lvl="0" indent="0" defTabSz="914400" rtl="0" eaLnBrk="0" fontAlgn="base" latinLnBrk="0" hangingPunct="0">
+              <a:lnSpc>
+                <a:spcPct val="150000"/>
+              </a:lnSpc>
+              <a:spcBef>
+                <a:spcPct val="0"/>
+              </a:spcBef>
+              <a:spcAft>
+                <a:spcPts val="600"/>
+              </a:spcAft>
+              <a:buClrTx/>
+              <a:buSzTx/>
+              <a:buFontTx/>
+              <a:buChar char="•"/>
+              <a:tabLst/>
+            </a:pPr>
+            <a:r>
+              <a:rPr kumimoji="0" lang="hu-HU" altLang="en-US" sz="2400" b="0" i="0" u="none" strike="noStrike" cap="none" normalizeH="0" baseline="0" dirty="0">
+                <a:ln>
+                  <a:noFill/>
+                </a:ln>
+                <a:effectLst/>
+                <a:latin typeface="Arial" panose="020B0604020202020204" pitchFamily="34" charset="0"/>
+              </a:rPr>
+              <a:t> </a:t>
+            </a:r>
+            <a:r>
+              <a:rPr kumimoji="0" lang="en-US" altLang="en-US" sz="2400" b="0" i="0" u="none" strike="noStrike" cap="none" normalizeH="0" baseline="0" dirty="0" err="1">
+                <a:ln>
+                  <a:noFill/>
+                </a:ln>
+                <a:effectLst/>
+                <a:latin typeface="Arial" panose="020B0604020202020204" pitchFamily="34" charset="0"/>
+              </a:rPr>
+              <a:t>Olvasási</a:t>
+            </a:r>
+            <a:r>
+              <a:rPr kumimoji="0" lang="en-US" altLang="en-US" sz="2400" b="0" i="0" u="none" strike="noStrike" cap="none" normalizeH="0" baseline="0" dirty="0">
+                <a:ln>
+                  <a:noFill/>
+                </a:ln>
+                <a:effectLst/>
+                <a:latin typeface="Arial" panose="020B0604020202020204" pitchFamily="34" charset="0"/>
+              </a:rPr>
+              <a:t> </a:t>
+            </a:r>
+            <a:r>
+              <a:rPr kumimoji="0" lang="en-US" altLang="en-US" sz="2400" b="0" i="0" u="none" strike="noStrike" cap="none" normalizeH="0" baseline="0" dirty="0" err="1">
+                <a:ln>
+                  <a:noFill/>
+                </a:ln>
+                <a:effectLst/>
+                <a:latin typeface="Arial" panose="020B0604020202020204" pitchFamily="34" charset="0"/>
+              </a:rPr>
+              <a:t>művelet</a:t>
+            </a:r>
+            <a:r>
+              <a:rPr kumimoji="0" lang="hu-HU" altLang="en-US" sz="2400" b="0" i="0" u="none" strike="noStrike" cap="none" normalizeH="0" baseline="0" dirty="0">
+                <a:ln>
+                  <a:noFill/>
+                </a:ln>
+                <a:effectLst/>
+                <a:latin typeface="Arial" panose="020B0604020202020204" pitchFamily="34" charset="0"/>
+              </a:rPr>
+              <a:t> (lekérdezés)</a:t>
+            </a:r>
+            <a:endParaRPr kumimoji="0" lang="en-US" altLang="en-US" sz="2400" b="0" i="0" u="none" strike="noStrike" cap="none" normalizeH="0" baseline="0" dirty="0">
+              <a:ln>
+                <a:noFill/>
+              </a:ln>
+              <a:effectLst/>
+              <a:latin typeface="Arial" panose="020B0604020202020204" pitchFamily="34" charset="0"/>
+            </a:endParaRPr>
+          </a:p>
+          <a:p>
+            <a:pPr marL="0" marR="0" lvl="0" indent="0" defTabSz="914400" rtl="0" eaLnBrk="0" fontAlgn="base" latinLnBrk="0" hangingPunct="0">
+              <a:lnSpc>
+                <a:spcPct val="150000"/>
+              </a:lnSpc>
+              <a:spcBef>
+                <a:spcPct val="0"/>
+              </a:spcBef>
+              <a:spcAft>
+                <a:spcPts val="600"/>
+              </a:spcAft>
+              <a:buClrTx/>
+              <a:buSzTx/>
+              <a:buFontTx/>
+              <a:buChar char="•"/>
+              <a:tabLst/>
+            </a:pPr>
+            <a:r>
+              <a:rPr kumimoji="0" lang="hu-HU" altLang="en-US" sz="2400" b="0" i="0" u="none" strike="noStrike" cap="none" normalizeH="0" baseline="0" dirty="0">
+                <a:ln>
+                  <a:noFill/>
+                </a:ln>
+                <a:effectLst/>
+                <a:latin typeface="Arial" panose="020B0604020202020204" pitchFamily="34" charset="0"/>
+              </a:rPr>
+              <a:t> </a:t>
+            </a:r>
+            <a:r>
+              <a:rPr kumimoji="0" lang="en-US" altLang="en-US" sz="2400" b="0" i="0" u="none" strike="noStrike" cap="none" normalizeH="0" baseline="0" dirty="0" err="1">
+                <a:ln>
+                  <a:noFill/>
+                </a:ln>
+                <a:effectLst/>
+                <a:latin typeface="Arial" panose="020B0604020202020204" pitchFamily="34" charset="0"/>
+              </a:rPr>
+              <a:t>Általában</a:t>
+            </a:r>
+            <a:r>
+              <a:rPr kumimoji="0" lang="en-US" altLang="en-US" sz="2400" b="0" i="0" u="none" strike="noStrike" cap="none" normalizeH="0" baseline="0" dirty="0">
+                <a:ln>
+                  <a:noFill/>
+                </a:ln>
+                <a:effectLst/>
+                <a:latin typeface="Arial" panose="020B0604020202020204" pitchFamily="34" charset="0"/>
+              </a:rPr>
+              <a:t> </a:t>
+            </a:r>
+            <a:r>
+              <a:rPr kumimoji="0" lang="en-US" altLang="en-US" sz="2400" b="0" i="0" u="none" strike="noStrike" cap="none" normalizeH="0" baseline="0" dirty="0" err="1">
+                <a:ln>
+                  <a:noFill/>
+                </a:ln>
+                <a:effectLst/>
+                <a:latin typeface="Arial" panose="020B0604020202020204" pitchFamily="34" charset="0"/>
+              </a:rPr>
+              <a:t>nincs</a:t>
+            </a:r>
+            <a:r>
+              <a:rPr kumimoji="0" lang="en-US" altLang="en-US" sz="2400" b="0" i="0" u="none" strike="noStrike" cap="none" normalizeH="0" baseline="0" dirty="0">
+                <a:ln>
+                  <a:noFill/>
+                </a:ln>
+                <a:effectLst/>
+                <a:latin typeface="Arial" panose="020B0604020202020204" pitchFamily="34" charset="0"/>
+              </a:rPr>
+              <a:t> body</a:t>
+            </a:r>
+          </a:p>
+          <a:p>
+            <a:pPr marL="0" marR="0" lvl="0" indent="0" defTabSz="914400" rtl="0" eaLnBrk="0" fontAlgn="base" latinLnBrk="0" hangingPunct="0">
+              <a:lnSpc>
+                <a:spcPct val="150000"/>
+              </a:lnSpc>
+              <a:spcBef>
+                <a:spcPct val="0"/>
+              </a:spcBef>
+              <a:spcAft>
+                <a:spcPts val="600"/>
+              </a:spcAft>
+              <a:buClrTx/>
+              <a:buSzTx/>
+              <a:buFontTx/>
+              <a:buChar char="•"/>
+              <a:tabLst/>
+            </a:pPr>
+            <a:r>
+              <a:rPr kumimoji="0" lang="hu-HU" altLang="en-US" sz="2400" b="0" i="0" u="none" strike="noStrike" cap="none" normalizeH="0" baseline="0" dirty="0">
+                <a:ln>
+                  <a:noFill/>
+                </a:ln>
+                <a:effectLst/>
+                <a:latin typeface="Arial" panose="020B0604020202020204" pitchFamily="34" charset="0"/>
+              </a:rPr>
+              <a:t> </a:t>
+            </a:r>
+            <a:r>
+              <a:rPr kumimoji="0" lang="en-US" altLang="en-US" sz="2400" b="0" i="0" u="none" strike="noStrike" cap="none" normalizeH="0" baseline="0" dirty="0" err="1">
+                <a:ln>
+                  <a:noFill/>
+                </a:ln>
+                <a:effectLst/>
+                <a:latin typeface="Arial" panose="020B0604020202020204" pitchFamily="34" charset="0"/>
+              </a:rPr>
+              <a:t>Biztonságos</a:t>
+            </a:r>
+            <a:r>
+              <a:rPr kumimoji="0" lang="en-US" altLang="en-US" sz="2400" b="0" i="0" u="none" strike="noStrike" cap="none" normalizeH="0" baseline="0" dirty="0">
+                <a:ln>
+                  <a:noFill/>
+                </a:ln>
+                <a:effectLst/>
+                <a:latin typeface="Arial" panose="020B0604020202020204" pitchFamily="34" charset="0"/>
+              </a:rPr>
+              <a:t> (safe)</a:t>
+            </a:r>
+          </a:p>
+          <a:p>
+            <a:pPr marL="0" marR="0" lvl="0" indent="0" defTabSz="914400" rtl="0" eaLnBrk="0" fontAlgn="base" latinLnBrk="0" hangingPunct="0">
+              <a:lnSpc>
+                <a:spcPct val="150000"/>
+              </a:lnSpc>
+              <a:spcBef>
+                <a:spcPct val="0"/>
+              </a:spcBef>
+              <a:spcAft>
+                <a:spcPts val="600"/>
+              </a:spcAft>
+              <a:buClrTx/>
+              <a:buSzTx/>
+              <a:buFontTx/>
+              <a:buChar char="•"/>
+              <a:tabLst/>
+            </a:pPr>
+            <a:r>
+              <a:rPr kumimoji="0" lang="hu-HU" altLang="en-US" sz="2400" b="0" i="0" u="none" strike="noStrike" cap="none" normalizeH="0" baseline="0" dirty="0">
+                <a:ln>
+                  <a:noFill/>
+                </a:ln>
+                <a:effectLst/>
+                <a:latin typeface="Arial" panose="020B0604020202020204" pitchFamily="34" charset="0"/>
+              </a:rPr>
+              <a:t> </a:t>
+            </a:r>
+            <a:r>
+              <a:rPr kumimoji="0" lang="en-US" altLang="en-US" sz="2400" b="0" i="0" u="none" strike="noStrike" cap="none" normalizeH="0" baseline="0" dirty="0" err="1">
+                <a:ln>
+                  <a:noFill/>
+                </a:ln>
+                <a:effectLst/>
+                <a:latin typeface="Arial" panose="020B0604020202020204" pitchFamily="34" charset="0"/>
+              </a:rPr>
+              <a:t>Idempotens</a:t>
+            </a:r>
+            <a:endParaRPr kumimoji="0" lang="en-US" altLang="en-US" sz="2400" b="0" i="0" u="none" strike="noStrike" cap="none" normalizeH="0" baseline="0" dirty="0">
+              <a:ln>
+                <a:noFill/>
+              </a:ln>
+              <a:effectLst/>
+              <a:latin typeface="Arial" panose="020B0604020202020204" pitchFamily="34" charset="0"/>
+            </a:endParaRPr>
+          </a:p>
+          <a:p>
+            <a:pPr marL="0" marR="0" lvl="0" indent="0" defTabSz="914400" rtl="0" eaLnBrk="0" fontAlgn="base" latinLnBrk="0" hangingPunct="0">
+              <a:lnSpc>
+                <a:spcPct val="150000"/>
+              </a:lnSpc>
+              <a:spcBef>
+                <a:spcPct val="0"/>
+              </a:spcBef>
+              <a:spcAft>
+                <a:spcPts val="600"/>
+              </a:spcAft>
+              <a:buClrTx/>
+              <a:buSzTx/>
+              <a:buFontTx/>
+              <a:buChar char="•"/>
+              <a:tabLst/>
+            </a:pPr>
+            <a:r>
+              <a:rPr kumimoji="0" lang="hu-HU" altLang="en-US" sz="2400" b="0" i="0" u="none" strike="noStrike" cap="none" normalizeH="0" baseline="0" dirty="0">
+                <a:ln>
+                  <a:noFill/>
+                </a:ln>
+                <a:effectLst/>
+                <a:latin typeface="Arial" panose="020B0604020202020204" pitchFamily="34" charset="0"/>
+              </a:rPr>
+              <a:t> </a:t>
+            </a:r>
+            <a:r>
+              <a:rPr kumimoji="0" lang="hu-HU" altLang="en-US" sz="2400" b="0" i="0" u="none" strike="noStrike" cap="none" normalizeH="0" baseline="0" dirty="0" err="1">
+                <a:ln>
+                  <a:noFill/>
+                </a:ln>
+                <a:effectLst/>
+                <a:latin typeface="Arial" panose="020B0604020202020204" pitchFamily="34" charset="0"/>
+              </a:rPr>
+              <a:t>Gyorsítótárazható</a:t>
+            </a:r>
+            <a:r>
+              <a:rPr kumimoji="0" lang="hu-HU" altLang="en-US" sz="2400" b="0" i="0" u="none" strike="noStrike" cap="none" normalizeH="0" baseline="0" dirty="0">
+                <a:ln>
+                  <a:noFill/>
+                </a:ln>
+                <a:effectLst/>
+                <a:latin typeface="Arial" panose="020B0604020202020204" pitchFamily="34" charset="0"/>
+              </a:rPr>
+              <a:t> (</a:t>
+            </a:r>
+            <a:r>
+              <a:rPr kumimoji="0" lang="en-US" altLang="en-US" sz="2400" b="0" i="0" u="none" strike="noStrike" cap="none" normalizeH="0" baseline="0" dirty="0">
+                <a:ln>
+                  <a:noFill/>
+                </a:ln>
+                <a:effectLst/>
+                <a:latin typeface="Arial" panose="020B0604020202020204" pitchFamily="34" charset="0"/>
+              </a:rPr>
+              <a:t>Cach</a:t>
+            </a:r>
+            <a:r>
+              <a:rPr kumimoji="0" lang="hu-HU" altLang="en-US" sz="2400" b="0" i="0" u="none" strike="noStrike" cap="none" normalizeH="0" baseline="0" dirty="0">
+                <a:ln>
+                  <a:noFill/>
+                </a:ln>
+                <a:effectLst/>
+                <a:latin typeface="Arial" panose="020B0604020202020204" pitchFamily="34" charset="0"/>
+              </a:rPr>
+              <a:t>ing)</a:t>
+            </a:r>
+          </a:p>
+          <a:p>
+            <a:pPr marL="0" lvl="0" indent="0" defTabSz="914400" eaLnBrk="0" fontAlgn="base" hangingPunct="0">
+              <a:lnSpc>
+                <a:spcPct val="150000"/>
+              </a:lnSpc>
+              <a:spcBef>
+                <a:spcPct val="0"/>
+              </a:spcBef>
+              <a:spcAft>
+                <a:spcPts val="600"/>
+              </a:spcAft>
+              <a:buFontTx/>
+              <a:buChar char="•"/>
+            </a:pPr>
+            <a:r>
+              <a:rPr lang="hu-HU" sz="2400" dirty="0"/>
+              <a:t> </a:t>
+            </a:r>
+            <a:r>
+              <a:rPr lang="en-US" sz="2400" dirty="0"/>
+              <a:t>URL query </a:t>
+            </a:r>
+            <a:r>
+              <a:rPr lang="en-US" sz="2400" dirty="0" err="1"/>
+              <a:t>paramétereket</a:t>
+            </a:r>
+            <a:r>
+              <a:rPr lang="en-US" sz="2400" dirty="0"/>
+              <a:t> </a:t>
+            </a:r>
+            <a:r>
+              <a:rPr lang="en-US" sz="2400" dirty="0" err="1"/>
+              <a:t>használ</a:t>
+            </a:r>
+            <a:r>
+              <a:rPr lang="hu-HU" sz="2400" dirty="0"/>
+              <a:t>hat</a:t>
+            </a:r>
+            <a:endParaRPr kumimoji="0" lang="en-US" altLang="en-US" sz="2400" b="0" i="0" u="none" strike="noStrike" cap="none" normalizeH="0" baseline="0" dirty="0">
+              <a:ln>
+                <a:noFill/>
+              </a:ln>
+              <a:effectLst/>
+              <a:latin typeface="Arial" panose="020B0604020202020204" pitchFamily="34" charset="0"/>
+            </a:endParaRPr>
+          </a:p>
+        </p:txBody>
+      </p:sp>
+    </p:spTree>
+  </p:cSld>
+  <p:clrMapOvr>
+    <a:masterClrMapping/>
+  </p:clrMapOvr>
+</p:sld>
+</file>
+
+<file path=ppt/slides/slide11.xml><?xml version="1.0" encoding="utf-8"?>
+<p:sld xmlns:a="http://schemas.openxmlformats.org/drawingml/2006/main" xmlns:r="http://schemas.openxmlformats.org/officeDocument/2006/relationships" xmlns:p="http://schemas.openxmlformats.org/presentationml/2006/main">
+  <p:cSld>
+    <p:bg>
+      <p:bgPr>
+        <a:solidFill>
+          <a:schemeClr val="bg1"/>
+        </a:solidFill>
+        <a:effectLst/>
+      </p:bgPr>
+    </p:bg>
+    <p:spTree>
+      <p:nvGrpSpPr>
+        <p:cNvPr id="1" name=""/>
+        <p:cNvGrpSpPr/>
+        <p:nvPr/>
+      </p:nvGrpSpPr>
+      <p:grpSpPr>
+        <a:xfrm>
+          <a:off x="0" y="0"/>
+          <a:ext cx="0" cy="0"/>
+          <a:chOff x="0" y="0"/>
+          <a:chExt cx="0" cy="0"/>
+        </a:xfrm>
+      </p:grpSpPr>
+      <p:sp useBgFill="1">
+        <p:nvSpPr>
+          <p:cNvPr id="9" name="Rectangle 8">
+            <a:extLst>
+              <a:ext uri="{FF2B5EF4-FFF2-40B4-BE49-F238E27FC236}">
+                <a16:creationId xmlns:a16="http://schemas.microsoft.com/office/drawing/2014/main" id="{100EDD19-6802-4EC3-95CE-CFFAB042CFD6}"/>
+              </a:ext>
+              <a:ext uri="{C183D7F6-B498-43B3-948B-1728B52AA6E4}">
+                <adec:decorative xmlns:adec="http://schemas.microsoft.com/office/drawing/2017/decorative" val="1"/>
+              </a:ext>
+            </a:extLst>
+          </p:cNvPr>
+          <p:cNvSpPr>
+            <a:spLocks noGrp="1" noRot="1" noChangeAspect="1" noMove="1" noResize="1" noEditPoints="1" noAdjustHandles="1" noChangeArrowheads="1" noChangeShapeType="1" noTextEdit="1"/>
+          </p:cNvSpPr>
+          <p:nvPr>
+            <p:extLst>
+              <p:ext uri="{386F3935-93C4-4BCD-93E2-E3B085C9AB24}">
+                <p16:designElem xmlns:p16="http://schemas.microsoft.com/office/powerpoint/2015/main" val="1"/>
+              </p:ext>
+            </p:extLst>
+          </p:nvPr>
+        </p:nvSpPr>
+        <p:spPr>
+          <a:xfrm>
+            <a:off x="0" y="0"/>
+            <a:ext cx="9141714" cy="6858000"/>
+          </a:xfrm>
+          <a:prstGeom prst="rect">
+            <a:avLst/>
+          </a:prstGeom>
+          <a:ln>
+            <a:noFill/>
+          </a:ln>
+        </p:spPr>
+        <p:style>
+          <a:lnRef idx="2">
+            <a:schemeClr val="accent1">
+              <a:shade val="50000"/>
+            </a:schemeClr>
+          </a:lnRef>
+          <a:fillRef idx="1">
+            <a:schemeClr val="accent1"/>
+          </a:fillRef>
+          <a:effectRef idx="0">
+            <a:schemeClr val="accent1"/>
+          </a:effectRef>
+          <a:fontRef idx="minor">
+            <a:schemeClr val="lt1"/>
+          </a:fontRef>
+        </p:style>
+        <p:txBody>
+          <a:bodyPr rtlCol="0" anchor="ctr"/>
+          <a:lstStyle/>
+          <a:p>
+            <a:pPr algn="ctr"/>
+            <a:endParaRPr lang="en-US"/>
+          </a:p>
+        </p:txBody>
+      </p:sp>
+      <p:sp>
+        <p:nvSpPr>
+          <p:cNvPr id="2" name="Title 1"/>
+          <p:cNvSpPr>
+            <a:spLocks noGrp="1"/>
+          </p:cNvSpPr>
+          <p:nvPr>
+            <p:ph type="title"/>
+          </p:nvPr>
+        </p:nvSpPr>
+        <p:spPr>
+          <a:xfrm>
+            <a:off x="628650" y="365125"/>
+            <a:ext cx="7886700" cy="1325563"/>
+          </a:xfrm>
+        </p:spPr>
+        <p:txBody>
+          <a:bodyPr>
+            <a:normAutofit/>
+          </a:bodyPr>
+          <a:lstStyle/>
+          <a:p>
+            <a:r>
+              <a:rPr lang="en-US" sz="4700"/>
+              <a:t>POST metódus</a:t>
+            </a:r>
+          </a:p>
+        </p:txBody>
+      </p:sp>
+      <p:sp>
+        <p:nvSpPr>
+          <p:cNvPr id="11" name="sketch line">
+            <a:extLst>
+              <a:ext uri="{FF2B5EF4-FFF2-40B4-BE49-F238E27FC236}">
+                <a16:creationId xmlns:a16="http://schemas.microsoft.com/office/drawing/2014/main" id="{DB17E863-922E-4C26-BD64-E8FD41D28661}"/>
+              </a:ext>
+              <a:ext uri="{C183D7F6-B498-43B3-948B-1728B52AA6E4}">
+                <adec:decorative xmlns:adec="http://schemas.microsoft.com/office/drawing/2017/decorative" val="1"/>
+              </a:ext>
+            </a:extLst>
+          </p:cNvPr>
+          <p:cNvSpPr>
+            <a:spLocks noGrp="1" noRot="1" noChangeAspect="1" noMove="1" noResize="1" noEditPoints="1" noAdjustHandles="1" noChangeArrowheads="1" noChangeShapeType="1" noTextEdit="1"/>
+          </p:cNvSpPr>
+          <p:nvPr>
+            <p:extLst>
+              <p:ext uri="{386F3935-93C4-4BCD-93E2-E3B085C9AB24}">
+                <p16:designElem xmlns:p16="http://schemas.microsoft.com/office/powerpoint/2015/main" val="1"/>
+              </p:ext>
+            </p:extLst>
+          </p:nvPr>
+        </p:nvSpPr>
+        <p:spPr>
+          <a:xfrm>
+            <a:off x="501777" y="1677373"/>
+            <a:ext cx="8140446" cy="18288"/>
+          </a:xfrm>
+          <a:custGeom>
+            <a:avLst/>
+            <a:gdLst>
+              <a:gd name="csX0" fmla="*/ 0 w 8140446"/>
+              <a:gd name="csY0" fmla="*/ 0 h 18288"/>
+              <a:gd name="csX1" fmla="*/ 434157 w 8140446"/>
+              <a:gd name="csY1" fmla="*/ 0 h 18288"/>
+              <a:gd name="csX2" fmla="*/ 1193932 w 8140446"/>
+              <a:gd name="csY2" fmla="*/ 0 h 18288"/>
+              <a:gd name="csX3" fmla="*/ 1628089 w 8140446"/>
+              <a:gd name="csY3" fmla="*/ 0 h 18288"/>
+              <a:gd name="csX4" fmla="*/ 2225055 w 8140446"/>
+              <a:gd name="csY4" fmla="*/ 0 h 18288"/>
+              <a:gd name="csX5" fmla="*/ 3066235 w 8140446"/>
+              <a:gd name="csY5" fmla="*/ 0 h 18288"/>
+              <a:gd name="csX6" fmla="*/ 3744605 w 8140446"/>
+              <a:gd name="csY6" fmla="*/ 0 h 18288"/>
+              <a:gd name="csX7" fmla="*/ 4504380 w 8140446"/>
+              <a:gd name="csY7" fmla="*/ 0 h 18288"/>
+              <a:gd name="csX8" fmla="*/ 5101346 w 8140446"/>
+              <a:gd name="csY8" fmla="*/ 0 h 18288"/>
+              <a:gd name="csX9" fmla="*/ 5779717 w 8140446"/>
+              <a:gd name="csY9" fmla="*/ 0 h 18288"/>
+              <a:gd name="csX10" fmla="*/ 6620896 w 8140446"/>
+              <a:gd name="csY10" fmla="*/ 0 h 18288"/>
+              <a:gd name="csX11" fmla="*/ 7136458 w 8140446"/>
+              <a:gd name="csY11" fmla="*/ 0 h 18288"/>
+              <a:gd name="csX12" fmla="*/ 8140446 w 8140446"/>
+              <a:gd name="csY12" fmla="*/ 0 h 18288"/>
+              <a:gd name="csX13" fmla="*/ 8140446 w 8140446"/>
+              <a:gd name="csY13" fmla="*/ 18288 h 18288"/>
+              <a:gd name="csX14" fmla="*/ 7543480 w 8140446"/>
+              <a:gd name="csY14" fmla="*/ 18288 h 18288"/>
+              <a:gd name="csX15" fmla="*/ 7109323 w 8140446"/>
+              <a:gd name="csY15" fmla="*/ 18288 h 18288"/>
+              <a:gd name="csX16" fmla="*/ 6430952 w 8140446"/>
+              <a:gd name="csY16" fmla="*/ 18288 h 18288"/>
+              <a:gd name="csX17" fmla="*/ 5915391 w 8140446"/>
+              <a:gd name="csY17" fmla="*/ 18288 h 18288"/>
+              <a:gd name="csX18" fmla="*/ 5237020 w 8140446"/>
+              <a:gd name="csY18" fmla="*/ 18288 h 18288"/>
+              <a:gd name="csX19" fmla="*/ 4558650 w 8140446"/>
+              <a:gd name="csY19" fmla="*/ 18288 h 18288"/>
+              <a:gd name="csX20" fmla="*/ 3880279 w 8140446"/>
+              <a:gd name="csY20" fmla="*/ 18288 h 18288"/>
+              <a:gd name="csX21" fmla="*/ 3201909 w 8140446"/>
+              <a:gd name="csY21" fmla="*/ 18288 h 18288"/>
+              <a:gd name="csX22" fmla="*/ 2604943 w 8140446"/>
+              <a:gd name="csY22" fmla="*/ 18288 h 18288"/>
+              <a:gd name="csX23" fmla="*/ 1845168 w 8140446"/>
+              <a:gd name="csY23" fmla="*/ 18288 h 18288"/>
+              <a:gd name="csX24" fmla="*/ 1166797 w 8140446"/>
+              <a:gd name="csY24" fmla="*/ 18288 h 18288"/>
+              <a:gd name="csX25" fmla="*/ 0 w 8140446"/>
+              <a:gd name="csY25" fmla="*/ 18288 h 18288"/>
+              <a:gd name="csX26" fmla="*/ 0 w 8140446"/>
+              <a:gd name="csY26" fmla="*/ 0 h 18288"/>
+            </a:gdLst>
+            <a:ahLst/>
+            <a:cxnLst>
+              <a:cxn ang="0">
+                <a:pos x="csX0" y="csY0"/>
+              </a:cxn>
+              <a:cxn ang="0">
+                <a:pos x="csX1" y="csY1"/>
+              </a:cxn>
+              <a:cxn ang="0">
+                <a:pos x="csX2" y="csY2"/>
+              </a:cxn>
+              <a:cxn ang="0">
+                <a:pos x="csX3" y="csY3"/>
+              </a:cxn>
+              <a:cxn ang="0">
+                <a:pos x="csX4" y="csY4"/>
+              </a:cxn>
+              <a:cxn ang="0">
+                <a:pos x="csX5" y="csY5"/>
+              </a:cxn>
+              <a:cxn ang="0">
+                <a:pos x="csX6" y="csY6"/>
+              </a:cxn>
+              <a:cxn ang="0">
+                <a:pos x="csX7" y="csY7"/>
+              </a:cxn>
+              <a:cxn ang="0">
+                <a:pos x="csX8" y="csY8"/>
+              </a:cxn>
+              <a:cxn ang="0">
+                <a:pos x="csX9" y="csY9"/>
+              </a:cxn>
+              <a:cxn ang="0">
+                <a:pos x="csX10" y="csY10"/>
+              </a:cxn>
+              <a:cxn ang="0">
+                <a:pos x="csX11" y="csY11"/>
+              </a:cxn>
+              <a:cxn ang="0">
+                <a:pos x="csX12" y="csY12"/>
+              </a:cxn>
+              <a:cxn ang="0">
+                <a:pos x="csX13" y="csY13"/>
+              </a:cxn>
+              <a:cxn ang="0">
+                <a:pos x="csX14" y="csY14"/>
+              </a:cxn>
+              <a:cxn ang="0">
+                <a:pos x="csX15" y="csY15"/>
+              </a:cxn>
+              <a:cxn ang="0">
+                <a:pos x="csX16" y="csY16"/>
+              </a:cxn>
+              <a:cxn ang="0">
+                <a:pos x="csX17" y="csY17"/>
+              </a:cxn>
+              <a:cxn ang="0">
+                <a:pos x="csX18" y="csY18"/>
+              </a:cxn>
+              <a:cxn ang="0">
+                <a:pos x="csX19" y="csY19"/>
+              </a:cxn>
+              <a:cxn ang="0">
+                <a:pos x="csX20" y="csY20"/>
+              </a:cxn>
+              <a:cxn ang="0">
+                <a:pos x="csX21" y="csY21"/>
+              </a:cxn>
+              <a:cxn ang="0">
+                <a:pos x="csX22" y="csY22"/>
+              </a:cxn>
+              <a:cxn ang="0">
+                <a:pos x="csX23" y="csY23"/>
+              </a:cxn>
+              <a:cxn ang="0">
+                <a:pos x="csX24" y="csY24"/>
+              </a:cxn>
+              <a:cxn ang="0">
+                <a:pos x="csX25" y="csY25"/>
+              </a:cxn>
+              <a:cxn ang="0">
+                <a:pos x="csX26" y="csY26"/>
+              </a:cxn>
+            </a:cxnLst>
+            <a:rect l="l" t="t" r="r" b="b"/>
+            <a:pathLst>
+              <a:path w="8140446" h="18288" fill="none" extrusionOk="0">
+                <a:moveTo>
+                  <a:pt x="0" y="0"/>
+                </a:moveTo>
+                <a:cubicBezTo>
+                  <a:pt x="94920" y="9103"/>
+                  <a:pt x="287892" y="-4966"/>
+                  <a:pt x="434157" y="0"/>
+                </a:cubicBezTo>
+                <a:cubicBezTo>
+                  <a:pt x="580422" y="4966"/>
+                  <a:pt x="943595" y="-14182"/>
+                  <a:pt x="1193932" y="0"/>
+                </a:cubicBezTo>
+                <a:cubicBezTo>
+                  <a:pt x="1444270" y="14182"/>
+                  <a:pt x="1472129" y="5523"/>
+                  <a:pt x="1628089" y="0"/>
+                </a:cubicBezTo>
+                <a:cubicBezTo>
+                  <a:pt x="1784049" y="-5523"/>
+                  <a:pt x="1962419" y="-17322"/>
+                  <a:pt x="2225055" y="0"/>
+                </a:cubicBezTo>
+                <a:cubicBezTo>
+                  <a:pt x="2487691" y="17322"/>
+                  <a:pt x="2700681" y="1311"/>
+                  <a:pt x="3066235" y="0"/>
+                </a:cubicBezTo>
+                <a:cubicBezTo>
+                  <a:pt x="3431789" y="-1311"/>
+                  <a:pt x="3405662" y="25081"/>
+                  <a:pt x="3744605" y="0"/>
+                </a:cubicBezTo>
+                <a:cubicBezTo>
+                  <a:pt x="4083548" y="-25081"/>
+                  <a:pt x="4265111" y="-11945"/>
+                  <a:pt x="4504380" y="0"/>
+                </a:cubicBezTo>
+                <a:cubicBezTo>
+                  <a:pt x="4743649" y="11945"/>
+                  <a:pt x="4860394" y="-2832"/>
+                  <a:pt x="5101346" y="0"/>
+                </a:cubicBezTo>
+                <a:cubicBezTo>
+                  <a:pt x="5342298" y="2832"/>
+                  <a:pt x="5456387" y="23676"/>
+                  <a:pt x="5779717" y="0"/>
+                </a:cubicBezTo>
+                <a:cubicBezTo>
+                  <a:pt x="6103047" y="-23676"/>
+                  <a:pt x="6270379" y="-37291"/>
+                  <a:pt x="6620896" y="0"/>
+                </a:cubicBezTo>
+                <a:cubicBezTo>
+                  <a:pt x="6971413" y="37291"/>
+                  <a:pt x="6989068" y="24674"/>
+                  <a:pt x="7136458" y="0"/>
+                </a:cubicBezTo>
+                <a:cubicBezTo>
+                  <a:pt x="7283848" y="-24674"/>
+                  <a:pt x="7752532" y="-22436"/>
+                  <a:pt x="8140446" y="0"/>
+                </a:cubicBezTo>
+                <a:cubicBezTo>
+                  <a:pt x="8140314" y="7702"/>
+                  <a:pt x="8140234" y="13511"/>
+                  <a:pt x="8140446" y="18288"/>
+                </a:cubicBezTo>
+                <a:cubicBezTo>
+                  <a:pt x="7906329" y="-3043"/>
+                  <a:pt x="7681180" y="27465"/>
+                  <a:pt x="7543480" y="18288"/>
+                </a:cubicBezTo>
+                <a:cubicBezTo>
+                  <a:pt x="7405780" y="9111"/>
+                  <a:pt x="7216607" y="3660"/>
+                  <a:pt x="7109323" y="18288"/>
+                </a:cubicBezTo>
+                <a:cubicBezTo>
+                  <a:pt x="7002039" y="32916"/>
+                  <a:pt x="6576231" y="42692"/>
+                  <a:pt x="6430952" y="18288"/>
+                </a:cubicBezTo>
+                <a:cubicBezTo>
+                  <a:pt x="6285673" y="-6116"/>
+                  <a:pt x="6138840" y="34521"/>
+                  <a:pt x="5915391" y="18288"/>
+                </a:cubicBezTo>
+                <a:cubicBezTo>
+                  <a:pt x="5691942" y="2055"/>
+                  <a:pt x="5459460" y="51666"/>
+                  <a:pt x="5237020" y="18288"/>
+                </a:cubicBezTo>
+                <a:cubicBezTo>
+                  <a:pt x="5014580" y="-15090"/>
+                  <a:pt x="4747677" y="40449"/>
+                  <a:pt x="4558650" y="18288"/>
+                </a:cubicBezTo>
+                <a:cubicBezTo>
+                  <a:pt x="4369623" y="-3873"/>
+                  <a:pt x="4146061" y="12568"/>
+                  <a:pt x="3880279" y="18288"/>
+                </a:cubicBezTo>
+                <a:cubicBezTo>
+                  <a:pt x="3614497" y="24008"/>
+                  <a:pt x="3473808" y="-12908"/>
+                  <a:pt x="3201909" y="18288"/>
+                </a:cubicBezTo>
+                <a:cubicBezTo>
+                  <a:pt x="2930010" y="49484"/>
+                  <a:pt x="2728175" y="-3430"/>
+                  <a:pt x="2604943" y="18288"/>
+                </a:cubicBezTo>
+                <a:cubicBezTo>
+                  <a:pt x="2481711" y="40006"/>
+                  <a:pt x="2004334" y="26952"/>
+                  <a:pt x="1845168" y="18288"/>
+                </a:cubicBezTo>
+                <a:cubicBezTo>
+                  <a:pt x="1686003" y="9624"/>
+                  <a:pt x="1375070" y="37580"/>
+                  <a:pt x="1166797" y="18288"/>
+                </a:cubicBezTo>
+                <a:cubicBezTo>
+                  <a:pt x="958524" y="-1004"/>
+                  <a:pt x="342846" y="8880"/>
+                  <a:pt x="0" y="18288"/>
+                </a:cubicBezTo>
+                <a:cubicBezTo>
+                  <a:pt x="129" y="13298"/>
+                  <a:pt x="-675" y="6857"/>
+                  <a:pt x="0" y="0"/>
+                </a:cubicBezTo>
+                <a:close/>
+              </a:path>
+              <a:path w="8140446" h="18288" stroke="0" extrusionOk="0">
+                <a:moveTo>
+                  <a:pt x="0" y="0"/>
+                </a:moveTo>
+                <a:cubicBezTo>
+                  <a:pt x="142435" y="-24533"/>
+                  <a:pt x="380026" y="17447"/>
+                  <a:pt x="596966" y="0"/>
+                </a:cubicBezTo>
+                <a:cubicBezTo>
+                  <a:pt x="813906" y="-17447"/>
+                  <a:pt x="830530" y="13462"/>
+                  <a:pt x="1031123" y="0"/>
+                </a:cubicBezTo>
+                <a:cubicBezTo>
+                  <a:pt x="1231716" y="-13462"/>
+                  <a:pt x="1634038" y="0"/>
+                  <a:pt x="1872303" y="0"/>
+                </a:cubicBezTo>
+                <a:cubicBezTo>
+                  <a:pt x="2110568" y="0"/>
+                  <a:pt x="2261934" y="-25727"/>
+                  <a:pt x="2469269" y="0"/>
+                </a:cubicBezTo>
+                <a:cubicBezTo>
+                  <a:pt x="2676604" y="25727"/>
+                  <a:pt x="2790440" y="16284"/>
+                  <a:pt x="3066235" y="0"/>
+                </a:cubicBezTo>
+                <a:cubicBezTo>
+                  <a:pt x="3342030" y="-16284"/>
+                  <a:pt x="3685603" y="41976"/>
+                  <a:pt x="3907414" y="0"/>
+                </a:cubicBezTo>
+                <a:cubicBezTo>
+                  <a:pt x="4129225" y="-41976"/>
+                  <a:pt x="4177416" y="-7598"/>
+                  <a:pt x="4422976" y="0"/>
+                </a:cubicBezTo>
+                <a:cubicBezTo>
+                  <a:pt x="4668536" y="7598"/>
+                  <a:pt x="5023499" y="-28058"/>
+                  <a:pt x="5264155" y="0"/>
+                </a:cubicBezTo>
+                <a:cubicBezTo>
+                  <a:pt x="5504811" y="28058"/>
+                  <a:pt x="5703675" y="13288"/>
+                  <a:pt x="6105335" y="0"/>
+                </a:cubicBezTo>
+                <a:cubicBezTo>
+                  <a:pt x="6506995" y="-13288"/>
+                  <a:pt x="6455516" y="-5124"/>
+                  <a:pt x="6783705" y="0"/>
+                </a:cubicBezTo>
+                <a:cubicBezTo>
+                  <a:pt x="7111894" y="5124"/>
+                  <a:pt x="7512856" y="10604"/>
+                  <a:pt x="8140446" y="0"/>
+                </a:cubicBezTo>
+                <a:cubicBezTo>
+                  <a:pt x="8140458" y="8833"/>
+                  <a:pt x="8140986" y="9830"/>
+                  <a:pt x="8140446" y="18288"/>
+                </a:cubicBezTo>
+                <a:cubicBezTo>
+                  <a:pt x="7959314" y="3345"/>
+                  <a:pt x="7870113" y="10437"/>
+                  <a:pt x="7706289" y="18288"/>
+                </a:cubicBezTo>
+                <a:cubicBezTo>
+                  <a:pt x="7542465" y="26139"/>
+                  <a:pt x="7157940" y="17482"/>
+                  <a:pt x="6865109" y="18288"/>
+                </a:cubicBezTo>
+                <a:cubicBezTo>
+                  <a:pt x="6572278" y="19094"/>
+                  <a:pt x="6524256" y="38051"/>
+                  <a:pt x="6349548" y="18288"/>
+                </a:cubicBezTo>
+                <a:cubicBezTo>
+                  <a:pt x="6174840" y="-1475"/>
+                  <a:pt x="5951624" y="174"/>
+                  <a:pt x="5671177" y="18288"/>
+                </a:cubicBezTo>
+                <a:cubicBezTo>
+                  <a:pt x="5390730" y="36402"/>
+                  <a:pt x="5222992" y="60058"/>
+                  <a:pt x="4829998" y="18288"/>
+                </a:cubicBezTo>
+                <a:cubicBezTo>
+                  <a:pt x="4437004" y="-23482"/>
+                  <a:pt x="4344181" y="39087"/>
+                  <a:pt x="4151627" y="18288"/>
+                </a:cubicBezTo>
+                <a:cubicBezTo>
+                  <a:pt x="3959073" y="-2511"/>
+                  <a:pt x="3886970" y="32875"/>
+                  <a:pt x="3717470" y="18288"/>
+                </a:cubicBezTo>
+                <a:cubicBezTo>
+                  <a:pt x="3547970" y="3701"/>
+                  <a:pt x="3451521" y="31872"/>
+                  <a:pt x="3201909" y="18288"/>
+                </a:cubicBezTo>
+                <a:cubicBezTo>
+                  <a:pt x="2952297" y="4704"/>
+                  <a:pt x="2543413" y="6029"/>
+                  <a:pt x="2360729" y="18288"/>
+                </a:cubicBezTo>
+                <a:cubicBezTo>
+                  <a:pt x="2178045" y="30547"/>
+                  <a:pt x="1906056" y="25847"/>
+                  <a:pt x="1682359" y="18288"/>
+                </a:cubicBezTo>
+                <a:cubicBezTo>
+                  <a:pt x="1458662" y="10730"/>
+                  <a:pt x="1330405" y="8046"/>
+                  <a:pt x="1166797" y="18288"/>
+                </a:cubicBezTo>
+                <a:cubicBezTo>
+                  <a:pt x="1003189" y="28530"/>
+                  <a:pt x="278098" y="19533"/>
+                  <a:pt x="0" y="18288"/>
+                </a:cubicBezTo>
+                <a:cubicBezTo>
+                  <a:pt x="74" y="14054"/>
+                  <a:pt x="-46" y="6997"/>
+                  <a:pt x="0" y="0"/>
+                </a:cubicBezTo>
+                <a:close/>
+              </a:path>
+            </a:pathLst>
+          </a:custGeom>
+          <a:solidFill>
+            <a:schemeClr val="accent2"/>
+          </a:solidFill>
+          <a:ln w="41275" cap="rnd">
+            <a:solidFill>
+              <a:schemeClr val="accent2"/>
+            </a:solidFill>
+            <a:round/>
+            <a:extLst>
+              <a:ext uri="{C807C97D-BFC1-408E-A445-0C87EB9F89A2}">
+                <ask:lineSketchStyleProps xmlns:ask="http://schemas.microsoft.com/office/drawing/2018/sketchyshapes" sd="1219033472">
+                  <a:prstGeom prst="rect">
+                    <a:avLst/>
+                  </a:prstGeom>
+                  <ask:type>
+                    <ask:lineSketchFreehand/>
+                  </ask:type>
+                </ask:lineSketchStyleProps>
+              </a:ext>
+            </a:extLst>
+          </a:ln>
+        </p:spPr>
+        <p:style>
+          <a:lnRef idx="2">
+            <a:schemeClr val="accent1">
+              <a:shade val="50000"/>
+            </a:schemeClr>
+          </a:lnRef>
+          <a:fillRef idx="1">
+            <a:schemeClr val="accent1"/>
+          </a:fillRef>
+          <a:effectRef idx="0">
+            <a:schemeClr val="accent1"/>
+          </a:effectRef>
+          <a:fontRef idx="minor">
+            <a:schemeClr val="lt1"/>
+          </a:fontRef>
+        </p:style>
+        <p:txBody>
+          <a:bodyPr rtlCol="0" anchor="ctr"/>
+          <a:lstStyle/>
+          <a:p>
+            <a:pPr algn="ctr"/>
+            <a:endParaRPr lang="en-US"/>
+          </a:p>
+        </p:txBody>
+      </p:sp>
+      <p:sp>
+        <p:nvSpPr>
+          <p:cNvPr id="4" name="Rectangle 1">
+            <a:extLst>
+              <a:ext uri="{FF2B5EF4-FFF2-40B4-BE49-F238E27FC236}">
                 <a16:creationId xmlns:a16="http://schemas.microsoft.com/office/drawing/2014/main" id="{0D8F1D72-EF5C-9F5A-7910-81C010174FDF}"/>
               </a:ext>
             </a:extLst>
@@ -15422,7 +16322,7 @@
 </p:sld>
 </file>
 
-<file path=ppt/slides/slide11.xml><?xml version="1.0" encoding="utf-8"?>
+<file path=ppt/slides/slide12.xml><?xml version="1.0" encoding="utf-8"?>
 <p:sld xmlns:a="http://schemas.openxmlformats.org/drawingml/2006/main" xmlns:r="http://schemas.openxmlformats.org/officeDocument/2006/relationships" xmlns:p="http://schemas.openxmlformats.org/presentationml/2006/main">
   <p:cSld>
     <p:bg>
@@ -16148,7 +17048,7 @@
 </p:sld>
 </file>
 
-<file path=ppt/slides/slide12.xml><?xml version="1.0" encoding="utf-8"?>
+<file path=ppt/slides/slide13.xml><?xml version="1.0" encoding="utf-8"?>
 <p:sld xmlns:a="http://schemas.openxmlformats.org/drawingml/2006/main" xmlns:r="http://schemas.openxmlformats.org/officeDocument/2006/relationships" xmlns:p="http://schemas.openxmlformats.org/presentationml/2006/main">
   <p:cSld>
     <p:bg>
@@ -16853,7 +17753,7 @@
 </p:sld>
 </file>
 
-<file path=ppt/slides/slide13.xml><?xml version="1.0" encoding="utf-8"?>
+<file path=ppt/slides/slide14.xml><?xml version="1.0" encoding="utf-8"?>
 <p:sld xmlns:a="http://schemas.openxmlformats.org/drawingml/2006/main" xmlns:r="http://schemas.openxmlformats.org/officeDocument/2006/relationships" xmlns:p="http://schemas.openxmlformats.org/presentationml/2006/main">
   <p:cSld>
     <p:bg>
@@ -17774,7 +18674,7 @@
 </p:sld>
 </file>
 
-<file path=ppt/slides/slide14.xml><?xml version="1.0" encoding="utf-8"?>
+<file path=ppt/slides/slide15.xml><?xml version="1.0" encoding="utf-8"?>
 <p:sld xmlns:a="http://schemas.openxmlformats.org/drawingml/2006/main" xmlns:r="http://schemas.openxmlformats.org/officeDocument/2006/relationships" xmlns:p="http://schemas.openxmlformats.org/presentationml/2006/main">
   <p:cSld>
     <p:bg>
@@ -18464,7 +19364,7 @@
 </p:sld>
 </file>
 
-<file path=ppt/slides/slide15.xml><?xml version="1.0" encoding="utf-8"?>
+<file path=ppt/slides/slide16.xml><?xml version="1.0" encoding="utf-8"?>
 <p:sld xmlns:a="http://schemas.openxmlformats.org/drawingml/2006/main" xmlns:r="http://schemas.openxmlformats.org/officeDocument/2006/relationships" xmlns:p="http://schemas.openxmlformats.org/presentationml/2006/main">
   <p:cSld>
     <p:bg>
@@ -19164,7 +20064,7 @@
 </p:sld>
 </file>
 
-<file path=ppt/slides/slide16.xml><?xml version="1.0" encoding="utf-8"?>
+<file path=ppt/slides/slide17.xml><?xml version="1.0" encoding="utf-8"?>
 <p:sld xmlns:a="http://schemas.openxmlformats.org/drawingml/2006/main" xmlns:r="http://schemas.openxmlformats.org/officeDocument/2006/relationships" xmlns:p="http://schemas.openxmlformats.org/presentationml/2006/main">
   <p:cSld>
     <p:bg>
@@ -19998,7 +20898,7 @@
 </p:sld>
 </file>
 
-<file path=ppt/slides/slide17.xml><?xml version="1.0" encoding="utf-8"?>
+<file path=ppt/slides/slide18.xml><?xml version="1.0" encoding="utf-8"?>
 <p:sld xmlns:a="http://schemas.openxmlformats.org/drawingml/2006/main" xmlns:r="http://schemas.openxmlformats.org/officeDocument/2006/relationships" xmlns:p="http://schemas.openxmlformats.org/presentationml/2006/main">
   <p:cSld>
     <p:bg>
@@ -20824,7 +21724,7 @@
 </p:sld>
 </file>
 
-<file path=ppt/slides/slide18.xml><?xml version="1.0" encoding="utf-8"?>
+<file path=ppt/slides/slide19.xml><?xml version="1.0" encoding="utf-8"?>
 <p:sld xmlns:a="http://schemas.openxmlformats.org/drawingml/2006/main" xmlns:r="http://schemas.openxmlformats.org/officeDocument/2006/relationships" xmlns:p="http://schemas.openxmlformats.org/presentationml/2006/main">
   <p:cSld>
     <p:bg>
@@ -21592,7 +22492,304 @@
 </p:sld>
 </file>
 
-<file path=ppt/slides/slide19.xml><?xml version="1.0" encoding="utf-8"?>
+<file path=ppt/slides/slide2.xml><?xml version="1.0" encoding="utf-8"?>
+<p:sld xmlns:a="http://schemas.openxmlformats.org/drawingml/2006/main" xmlns:r="http://schemas.openxmlformats.org/officeDocument/2006/relationships" xmlns:p="http://schemas.openxmlformats.org/presentationml/2006/main">
+  <p:cSld>
+    <p:bg>
+      <p:bgPr>
+        <a:solidFill>
+          <a:schemeClr val="bg1"/>
+        </a:solidFill>
+        <a:effectLst/>
+      </p:bgPr>
+    </p:bg>
+    <p:spTree>
+      <p:nvGrpSpPr>
+        <p:cNvPr id="1" name=""/>
+        <p:cNvGrpSpPr/>
+        <p:nvPr/>
+      </p:nvGrpSpPr>
+      <p:grpSpPr>
+        <a:xfrm>
+          <a:off x="0" y="0"/>
+          <a:ext cx="0" cy="0"/>
+          <a:chOff x="0" y="0"/>
+          <a:chExt cx="0" cy="0"/>
+        </a:xfrm>
+      </p:grpSpPr>
+      <p:sp useBgFill="1">
+        <p:nvSpPr>
+          <p:cNvPr id="15" name="Rectangle 14">
+            <a:extLst>
+              <a:ext uri="{FF2B5EF4-FFF2-40B4-BE49-F238E27FC236}">
+                <a16:creationId xmlns:a16="http://schemas.microsoft.com/office/drawing/2014/main" id="{9DBC8166-481C-4473-95F5-9A5B9073B7F1}"/>
+              </a:ext>
+              <a:ext uri="{C183D7F6-B498-43B3-948B-1728B52AA6E4}">
+                <adec:decorative xmlns:adec="http://schemas.microsoft.com/office/drawing/2017/decorative" val="1"/>
+              </a:ext>
+            </a:extLst>
+          </p:cNvPr>
+          <p:cNvSpPr>
+            <a:spLocks noGrp="1" noRot="1" noChangeAspect="1" noMove="1" noResize="1" noEditPoints="1" noAdjustHandles="1" noChangeArrowheads="1" noChangeShapeType="1" noTextEdit="1"/>
+          </p:cNvSpPr>
+          <p:nvPr>
+            <p:extLst>
+              <p:ext uri="{386F3935-93C4-4BCD-93E2-E3B085C9AB24}">
+                <p16:designElem xmlns:p16="http://schemas.microsoft.com/office/powerpoint/2015/main" val="1"/>
+              </p:ext>
+            </p:extLst>
+          </p:nvPr>
+        </p:nvSpPr>
+        <p:spPr>
+          <a:xfrm>
+            <a:off x="0" y="0"/>
+            <a:ext cx="9141714" cy="6858000"/>
+          </a:xfrm>
+          <a:prstGeom prst="rect">
+            <a:avLst/>
+          </a:prstGeom>
+          <a:ln>
+            <a:noFill/>
+          </a:ln>
+        </p:spPr>
+        <p:style>
+          <a:lnRef idx="2">
+            <a:schemeClr val="accent1">
+              <a:shade val="50000"/>
+            </a:schemeClr>
+          </a:lnRef>
+          <a:fillRef idx="1">
+            <a:schemeClr val="accent1"/>
+          </a:fillRef>
+          <a:effectRef idx="0">
+            <a:schemeClr val="accent1"/>
+          </a:effectRef>
+          <a:fontRef idx="minor">
+            <a:schemeClr val="lt1"/>
+          </a:fontRef>
+        </p:style>
+        <p:txBody>
+          <a:bodyPr rtlCol="0" anchor="ctr"/>
+          <a:lstStyle/>
+          <a:p>
+            <a:pPr algn="ctr"/>
+            <a:endParaRPr lang="en-US"/>
+          </a:p>
+        </p:txBody>
+      </p:sp>
+      <p:sp>
+        <p:nvSpPr>
+          <p:cNvPr id="17" name="Freeform: Shape 16">
+            <a:extLst>
+              <a:ext uri="{FF2B5EF4-FFF2-40B4-BE49-F238E27FC236}">
+                <a16:creationId xmlns:a16="http://schemas.microsoft.com/office/drawing/2014/main" id="{A5A5CE6E-90AF-4D43-A014-1F9EC83EB93D}"/>
+              </a:ext>
+              <a:ext uri="{C183D7F6-B498-43B3-948B-1728B52AA6E4}">
+                <adec:decorative xmlns:adec="http://schemas.microsoft.com/office/drawing/2017/decorative" val="1"/>
+              </a:ext>
+            </a:extLst>
+          </p:cNvPr>
+          <p:cNvSpPr>
+            <a:spLocks noGrp="1" noRot="1" noChangeAspect="1" noMove="1" noResize="1" noEditPoints="1" noAdjustHandles="1" noChangeArrowheads="1" noChangeShapeType="1" noTextEdit="1"/>
+          </p:cNvSpPr>
+          <p:nvPr>
+            <p:extLst>
+              <p:ext uri="{386F3935-93C4-4BCD-93E2-E3B085C9AB24}">
+                <p16:designElem xmlns:p16="http://schemas.microsoft.com/office/powerpoint/2015/main" val="1"/>
+              </p:ext>
+            </p:extLst>
+          </p:nvPr>
+        </p:nvSpPr>
+        <p:spPr>
+          <a:xfrm>
+            <a:off x="0" y="1"/>
+            <a:ext cx="3384350" cy="6858000"/>
+          </a:xfrm>
+          <a:custGeom>
+            <a:avLst/>
+            <a:gdLst>
+              <a:gd name="connsiteX0" fmla="*/ 0 w 4512467"/>
+              <a:gd name="connsiteY0" fmla="*/ 0 h 6858000"/>
+              <a:gd name="connsiteX1" fmla="*/ 2579526 w 4512467"/>
+              <a:gd name="connsiteY1" fmla="*/ 0 h 6858000"/>
+              <a:gd name="connsiteX2" fmla="*/ 2583267 w 4512467"/>
+              <a:gd name="connsiteY2" fmla="*/ 2151 h 6858000"/>
+              <a:gd name="connsiteX3" fmla="*/ 4512467 w 4512467"/>
+              <a:gd name="connsiteY3" fmla="*/ 3429000 h 6858000"/>
+              <a:gd name="connsiteX4" fmla="*/ 2583267 w 4512467"/>
+              <a:gd name="connsiteY4" fmla="*/ 6855849 h 6858000"/>
+              <a:gd name="connsiteX5" fmla="*/ 2579526 w 4512467"/>
+              <a:gd name="connsiteY5" fmla="*/ 6858000 h 6858000"/>
+              <a:gd name="connsiteX6" fmla="*/ 0 w 4512467"/>
+              <a:gd name="connsiteY6" fmla="*/ 6858000 h 6858000"/>
+            </a:gdLst>
+            <a:ahLst/>
+            <a:cxnLst>
+              <a:cxn ang="0">
+                <a:pos x="connsiteX0" y="connsiteY0"/>
+              </a:cxn>
+              <a:cxn ang="0">
+                <a:pos x="connsiteX1" y="connsiteY1"/>
+              </a:cxn>
+              <a:cxn ang="0">
+                <a:pos x="connsiteX2" y="connsiteY2"/>
+              </a:cxn>
+              <a:cxn ang="0">
+                <a:pos x="connsiteX3" y="connsiteY3"/>
+              </a:cxn>
+              <a:cxn ang="0">
+                <a:pos x="connsiteX4" y="connsiteY4"/>
+              </a:cxn>
+              <a:cxn ang="0">
+                <a:pos x="connsiteX5" y="connsiteY5"/>
+              </a:cxn>
+              <a:cxn ang="0">
+                <a:pos x="connsiteX6" y="connsiteY6"/>
+              </a:cxn>
+            </a:cxnLst>
+            <a:rect l="l" t="t" r="r" b="b"/>
+            <a:pathLst>
+              <a:path w="4512467" h="6858000">
+                <a:moveTo>
+                  <a:pt x="0" y="0"/>
+                </a:moveTo>
+                <a:lnTo>
+                  <a:pt x="2579526" y="0"/>
+                </a:lnTo>
+                <a:lnTo>
+                  <a:pt x="2583267" y="2151"/>
+                </a:lnTo>
+                <a:cubicBezTo>
+                  <a:pt x="3739868" y="704919"/>
+                  <a:pt x="4512467" y="1976735"/>
+                  <a:pt x="4512467" y="3429000"/>
+                </a:cubicBezTo>
+                <a:cubicBezTo>
+                  <a:pt x="4512467" y="4881266"/>
+                  <a:pt x="3739868" y="6153081"/>
+                  <a:pt x="2583267" y="6855849"/>
+                </a:cubicBezTo>
+                <a:lnTo>
+                  <a:pt x="2579526" y="6858000"/>
+                </a:lnTo>
+                <a:lnTo>
+                  <a:pt x="0" y="6858000"/>
+                </a:lnTo>
+                <a:close/>
+              </a:path>
+            </a:pathLst>
+          </a:custGeom>
+          <a:solidFill>
+            <a:schemeClr val="accent2"/>
+          </a:solidFill>
+          <a:ln>
+            <a:noFill/>
+          </a:ln>
+        </p:spPr>
+        <p:style>
+          <a:lnRef idx="2">
+            <a:schemeClr val="accent1">
+              <a:shade val="50000"/>
+            </a:schemeClr>
+          </a:lnRef>
+          <a:fillRef idx="1">
+            <a:schemeClr val="accent1"/>
+          </a:fillRef>
+          <a:effectRef idx="0">
+            <a:schemeClr val="accent1"/>
+          </a:effectRef>
+          <a:fontRef idx="minor">
+            <a:schemeClr val="lt1"/>
+          </a:fontRef>
+        </p:style>
+        <p:txBody>
+          <a:bodyPr wrap="square" rtlCol="0" anchor="ctr">
+            <a:noAutofit/>
+          </a:bodyPr>
+          <a:lstStyle/>
+          <a:p>
+            <a:pPr algn="ctr"/>
+            <a:endParaRPr lang="en-US">
+              <a:solidFill>
+                <a:schemeClr val="bg1"/>
+              </a:solidFill>
+            </a:endParaRPr>
+          </a:p>
+        </p:txBody>
+      </p:sp>
+      <p:sp>
+        <p:nvSpPr>
+          <p:cNvPr id="2" name="Title 1"/>
+          <p:cNvSpPr>
+            <a:spLocks noGrp="1"/>
+          </p:cNvSpPr>
+          <p:nvPr>
+            <p:ph type="title"/>
+          </p:nvPr>
+        </p:nvSpPr>
+        <p:spPr>
+          <a:xfrm>
+            <a:off x="628650" y="643467"/>
+            <a:ext cx="2213403" cy="5571066"/>
+          </a:xfrm>
+        </p:spPr>
+        <p:txBody>
+          <a:bodyPr>
+            <a:normAutofit/>
+          </a:bodyPr>
+          <a:lstStyle/>
+          <a:p>
+            <a:r>
+              <a:rPr lang="hu-HU" sz="3700">
+                <a:solidFill>
+                  <a:srgbClr val="FFFFFF"/>
+                </a:solidFill>
+              </a:rPr>
+              <a:t>HTTP működése – HTTP/1.1 alapjai</a:t>
+            </a:r>
+          </a:p>
+        </p:txBody>
+      </p:sp>
+      <p:graphicFrame>
+        <p:nvGraphicFramePr>
+          <p:cNvPr id="5" name="Content Placeholder 2">
+            <a:extLst>
+              <a:ext uri="{FF2B5EF4-FFF2-40B4-BE49-F238E27FC236}">
+                <a16:creationId xmlns:a16="http://schemas.microsoft.com/office/drawing/2014/main" id="{5039E465-1570-FA04-7F1A-000829F5327B}"/>
+              </a:ext>
+            </a:extLst>
+          </p:cNvPr>
+          <p:cNvGraphicFramePr>
+            <a:graphicFrameLocks noGrp="1"/>
+          </p:cNvGraphicFramePr>
+          <p:nvPr>
+            <p:ph idx="1"/>
+            <p:extLst>
+              <p:ext uri="{D42A27DB-BD31-4B8C-83A1-F6EECF244321}">
+                <p14:modId xmlns:p14="http://schemas.microsoft.com/office/powerpoint/2010/main" val="4129153239"/>
+              </p:ext>
+            </p:extLst>
+          </p:nvPr>
+        </p:nvGraphicFramePr>
+        <p:xfrm>
+          <a:off x="3905730" y="643466"/>
+          <a:ext cx="4718785" cy="5530735"/>
+        </p:xfrm>
+        <a:graphic>
+          <a:graphicData uri="http://schemas.openxmlformats.org/drawingml/2006/diagram">
+            <dgm:relIds xmlns:dgm="http://schemas.openxmlformats.org/drawingml/2006/diagram" xmlns:r="http://schemas.openxmlformats.org/officeDocument/2006/relationships" r:dm="rId3" r:lo="rId4" r:qs="rId5" r:cs="rId6"/>
+          </a:graphicData>
+        </a:graphic>
+      </p:graphicFrame>
+    </p:spTree>
+  </p:cSld>
+  <p:clrMapOvr>
+    <a:masterClrMapping/>
+  </p:clrMapOvr>
+</p:sld>
+</file>
+
+<file path=ppt/slides/slide20.xml><?xml version="1.0" encoding="utf-8"?>
 <p:sld xmlns:a="http://schemas.openxmlformats.org/drawingml/2006/main" xmlns:r="http://schemas.openxmlformats.org/officeDocument/2006/relationships" xmlns:p="http://schemas.openxmlformats.org/presentationml/2006/main">
   <p:cSld>
     <p:bg>
@@ -22324,530 +23521,7 @@
 </p:sld>
 </file>
 
-<file path=ppt/slides/slide2.xml><?xml version="1.0" encoding="utf-8"?>
-<p:sld xmlns:a="http://schemas.openxmlformats.org/drawingml/2006/main" xmlns:r="http://schemas.openxmlformats.org/officeDocument/2006/relationships" xmlns:p="http://schemas.openxmlformats.org/presentationml/2006/main">
-  <p:cSld>
-    <p:bg>
-      <p:bgPr>
-        <a:solidFill>
-          <a:schemeClr val="bg1"/>
-        </a:solidFill>
-        <a:effectLst/>
-      </p:bgPr>
-    </p:bg>
-    <p:spTree>
-      <p:nvGrpSpPr>
-        <p:cNvPr id="1" name=""/>
-        <p:cNvGrpSpPr/>
-        <p:nvPr/>
-      </p:nvGrpSpPr>
-      <p:grpSpPr>
-        <a:xfrm>
-          <a:off x="0" y="0"/>
-          <a:ext cx="0" cy="0"/>
-          <a:chOff x="0" y="0"/>
-          <a:chExt cx="0" cy="0"/>
-        </a:xfrm>
-      </p:grpSpPr>
-      <p:sp useBgFill="1">
-        <p:nvSpPr>
-          <p:cNvPr id="5127" name="Rectangle 5126">
-            <a:extLst>
-              <a:ext uri="{FF2B5EF4-FFF2-40B4-BE49-F238E27FC236}">
-                <a16:creationId xmlns:a16="http://schemas.microsoft.com/office/drawing/2014/main" id="{743AA782-23D1-4521-8CAD-47662984AA08}"/>
-              </a:ext>
-              <a:ext uri="{C183D7F6-B498-43B3-948B-1728B52AA6E4}">
-                <adec:decorative xmlns:adec="http://schemas.microsoft.com/office/drawing/2017/decorative" val="1"/>
-              </a:ext>
-            </a:extLst>
-          </p:cNvPr>
-          <p:cNvSpPr>
-            <a:spLocks noGrp="1" noRot="1" noChangeAspect="1" noMove="1" noResize="1" noEditPoints="1" noAdjustHandles="1" noChangeArrowheads="1" noChangeShapeType="1" noTextEdit="1"/>
-          </p:cNvSpPr>
-          <p:nvPr>
-            <p:extLst>
-              <p:ext uri="{386F3935-93C4-4BCD-93E2-E3B085C9AB24}">
-                <p16:designElem xmlns:p16="http://schemas.microsoft.com/office/powerpoint/2015/main" val="1"/>
-              </p:ext>
-            </p:extLst>
-          </p:nvPr>
-        </p:nvSpPr>
-        <p:spPr>
-          <a:xfrm>
-            <a:off x="0" y="0"/>
-            <a:ext cx="9144000" cy="6858000"/>
-          </a:xfrm>
-          <a:prstGeom prst="rect">
-            <a:avLst/>
-          </a:prstGeom>
-          <a:ln>
-            <a:noFill/>
-          </a:ln>
-        </p:spPr>
-        <p:style>
-          <a:lnRef idx="2">
-            <a:schemeClr val="accent1">
-              <a:shade val="50000"/>
-            </a:schemeClr>
-          </a:lnRef>
-          <a:fillRef idx="1">
-            <a:schemeClr val="accent1"/>
-          </a:fillRef>
-          <a:effectRef idx="0">
-            <a:schemeClr val="accent1"/>
-          </a:effectRef>
-          <a:fontRef idx="minor">
-            <a:schemeClr val="lt1"/>
-          </a:fontRef>
-        </p:style>
-        <p:txBody>
-          <a:bodyPr rtlCol="0" anchor="ctr"/>
-          <a:lstStyle/>
-          <a:p>
-            <a:pPr algn="ctr"/>
-            <a:endParaRPr lang="en-US"/>
-          </a:p>
-        </p:txBody>
-      </p:sp>
-      <p:sp>
-        <p:nvSpPr>
-          <p:cNvPr id="2" name="Title 1"/>
-          <p:cNvSpPr>
-            <a:spLocks noGrp="1"/>
-          </p:cNvSpPr>
-          <p:nvPr>
-            <p:ph type="title"/>
-          </p:nvPr>
-        </p:nvSpPr>
-        <p:spPr>
-          <a:xfrm>
-            <a:off x="593782" y="611643"/>
-            <a:ext cx="4390199" cy="861546"/>
-          </a:xfrm>
-        </p:spPr>
-        <p:txBody>
-          <a:bodyPr anchor="b">
-            <a:normAutofit/>
-          </a:bodyPr>
-          <a:lstStyle/>
-          <a:p>
-            <a:pPr algn="l"/>
-            <a:r>
-              <a:rPr lang="en-US" sz="4700" dirty="0"/>
-              <a:t>Mi </a:t>
-            </a:r>
-            <a:r>
-              <a:rPr lang="en-US" sz="4700" dirty="0" err="1"/>
-              <a:t>az</a:t>
-            </a:r>
-            <a:r>
-              <a:rPr lang="en-US" sz="4700" dirty="0"/>
-              <a:t> a HTTP?</a:t>
-            </a:r>
-          </a:p>
-        </p:txBody>
-      </p:sp>
-      <p:sp>
-        <p:nvSpPr>
-          <p:cNvPr id="5129" name="sketch line">
-            <a:extLst>
-              <a:ext uri="{FF2B5EF4-FFF2-40B4-BE49-F238E27FC236}">
-                <a16:creationId xmlns:a16="http://schemas.microsoft.com/office/drawing/2014/main" id="{71877DBC-BB60-40F0-AC93-2ACDBAAE60CE}"/>
-              </a:ext>
-              <a:ext uri="{C183D7F6-B498-43B3-948B-1728B52AA6E4}">
-                <adec:decorative xmlns:adec="http://schemas.microsoft.com/office/drawing/2017/decorative" val="1"/>
-              </a:ext>
-            </a:extLst>
-          </p:cNvPr>
-          <p:cNvSpPr>
-            <a:spLocks noGrp="1" noRot="1" noChangeAspect="1" noMove="1" noResize="1" noEditPoints="1" noAdjustHandles="1" noChangeArrowheads="1" noChangeShapeType="1" noTextEdit="1"/>
-          </p:cNvSpPr>
-          <p:nvPr>
-            <p:extLst>
-              <p:ext uri="{386F3935-93C4-4BCD-93E2-E3B085C9AB24}">
-                <p16:designElem xmlns:p16="http://schemas.microsoft.com/office/powerpoint/2015/main" val="1"/>
-              </p:ext>
-            </p:extLst>
-          </p:nvPr>
-        </p:nvSpPr>
-        <p:spPr>
-          <a:xfrm>
-            <a:off x="482458" y="2372868"/>
-            <a:ext cx="2441321" cy="18288"/>
-          </a:xfrm>
-          <a:custGeom>
-            <a:avLst/>
-            <a:gdLst>
-              <a:gd name="csX0" fmla="*/ 0 w 2441321"/>
-              <a:gd name="csY0" fmla="*/ 0 h 18288"/>
-              <a:gd name="csX1" fmla="*/ 585917 w 2441321"/>
-              <a:gd name="csY1" fmla="*/ 0 h 18288"/>
-              <a:gd name="csX2" fmla="*/ 1196247 w 2441321"/>
-              <a:gd name="csY2" fmla="*/ 0 h 18288"/>
-              <a:gd name="csX3" fmla="*/ 1806578 w 2441321"/>
-              <a:gd name="csY3" fmla="*/ 0 h 18288"/>
-              <a:gd name="csX4" fmla="*/ 2441321 w 2441321"/>
-              <a:gd name="csY4" fmla="*/ 0 h 18288"/>
-              <a:gd name="csX5" fmla="*/ 2441321 w 2441321"/>
-              <a:gd name="csY5" fmla="*/ 18288 h 18288"/>
-              <a:gd name="csX6" fmla="*/ 1830991 w 2441321"/>
-              <a:gd name="csY6" fmla="*/ 18288 h 18288"/>
-              <a:gd name="csX7" fmla="*/ 1269487 w 2441321"/>
-              <a:gd name="csY7" fmla="*/ 18288 h 18288"/>
-              <a:gd name="csX8" fmla="*/ 707983 w 2441321"/>
-              <a:gd name="csY8" fmla="*/ 18288 h 18288"/>
-              <a:gd name="csX9" fmla="*/ 0 w 2441321"/>
-              <a:gd name="csY9" fmla="*/ 18288 h 18288"/>
-              <a:gd name="csX10" fmla="*/ 0 w 2441321"/>
-              <a:gd name="csY10" fmla="*/ 0 h 18288"/>
-            </a:gdLst>
-            <a:ahLst/>
-            <a:cxnLst>
-              <a:cxn ang="0">
-                <a:pos x="csX0" y="csY0"/>
-              </a:cxn>
-              <a:cxn ang="0">
-                <a:pos x="csX1" y="csY1"/>
-              </a:cxn>
-              <a:cxn ang="0">
-                <a:pos x="csX2" y="csY2"/>
-              </a:cxn>
-              <a:cxn ang="0">
-                <a:pos x="csX3" y="csY3"/>
-              </a:cxn>
-              <a:cxn ang="0">
-                <a:pos x="csX4" y="csY4"/>
-              </a:cxn>
-              <a:cxn ang="0">
-                <a:pos x="csX5" y="csY5"/>
-              </a:cxn>
-              <a:cxn ang="0">
-                <a:pos x="csX6" y="csY6"/>
-              </a:cxn>
-              <a:cxn ang="0">
-                <a:pos x="csX7" y="csY7"/>
-              </a:cxn>
-              <a:cxn ang="0">
-                <a:pos x="csX8" y="csY8"/>
-              </a:cxn>
-              <a:cxn ang="0">
-                <a:pos x="csX9" y="csY9"/>
-              </a:cxn>
-              <a:cxn ang="0">
-                <a:pos x="csX10" y="csY10"/>
-              </a:cxn>
-            </a:cxnLst>
-            <a:rect l="l" t="t" r="r" b="b"/>
-            <a:pathLst>
-              <a:path w="2441321" h="18288" fill="none" extrusionOk="0">
-                <a:moveTo>
-                  <a:pt x="0" y="0"/>
-                </a:moveTo>
-                <a:cubicBezTo>
-                  <a:pt x="273217" y="-17533"/>
-                  <a:pt x="355785" y="-4171"/>
-                  <a:pt x="585917" y="0"/>
-                </a:cubicBezTo>
-                <a:cubicBezTo>
-                  <a:pt x="816049" y="4171"/>
-                  <a:pt x="991446" y="-9419"/>
-                  <a:pt x="1196247" y="0"/>
-                </a:cubicBezTo>
-                <a:cubicBezTo>
-                  <a:pt x="1401048" y="9419"/>
-                  <a:pt x="1589984" y="-731"/>
-                  <a:pt x="1806578" y="0"/>
-                </a:cubicBezTo>
-                <a:cubicBezTo>
-                  <a:pt x="2023172" y="731"/>
-                  <a:pt x="2247754" y="8393"/>
-                  <a:pt x="2441321" y="0"/>
-                </a:cubicBezTo>
-                <a:cubicBezTo>
-                  <a:pt x="2441167" y="8655"/>
-                  <a:pt x="2440437" y="9975"/>
-                  <a:pt x="2441321" y="18288"/>
-                </a:cubicBezTo>
-                <a:cubicBezTo>
-                  <a:pt x="2169723" y="30506"/>
-                  <a:pt x="2045712" y="39140"/>
-                  <a:pt x="1830991" y="18288"/>
-                </a:cubicBezTo>
-                <a:cubicBezTo>
-                  <a:pt x="1616270" y="-2564"/>
-                  <a:pt x="1505876" y="3949"/>
-                  <a:pt x="1269487" y="18288"/>
-                </a:cubicBezTo>
-                <a:cubicBezTo>
-                  <a:pt x="1033098" y="32627"/>
-                  <a:pt x="908661" y="41191"/>
-                  <a:pt x="707983" y="18288"/>
-                </a:cubicBezTo>
-                <a:cubicBezTo>
-                  <a:pt x="507305" y="-4615"/>
-                  <a:pt x="333592" y="20759"/>
-                  <a:pt x="0" y="18288"/>
-                </a:cubicBezTo>
-                <a:cubicBezTo>
-                  <a:pt x="-688" y="11716"/>
-                  <a:pt x="875" y="6357"/>
-                  <a:pt x="0" y="0"/>
-                </a:cubicBezTo>
-                <a:close/>
-              </a:path>
-              <a:path w="2441321" h="18288" stroke="0" extrusionOk="0">
-                <a:moveTo>
-                  <a:pt x="0" y="0"/>
-                </a:moveTo>
-                <a:cubicBezTo>
-                  <a:pt x="207071" y="-14617"/>
-                  <a:pt x="444194" y="-15606"/>
-                  <a:pt x="585917" y="0"/>
-                </a:cubicBezTo>
-                <a:cubicBezTo>
-                  <a:pt x="727640" y="15606"/>
-                  <a:pt x="904326" y="-79"/>
-                  <a:pt x="1123008" y="0"/>
-                </a:cubicBezTo>
-                <a:cubicBezTo>
-                  <a:pt x="1341690" y="79"/>
-                  <a:pt x="1600014" y="10401"/>
-                  <a:pt x="1782164" y="0"/>
-                </a:cubicBezTo>
-                <a:cubicBezTo>
-                  <a:pt x="1964314" y="-10401"/>
-                  <a:pt x="2143537" y="-21488"/>
-                  <a:pt x="2441321" y="0"/>
-                </a:cubicBezTo>
-                <a:cubicBezTo>
-                  <a:pt x="2441735" y="5928"/>
-                  <a:pt x="2441551" y="11133"/>
-                  <a:pt x="2441321" y="18288"/>
-                </a:cubicBezTo>
-                <a:cubicBezTo>
-                  <a:pt x="2166745" y="28773"/>
-                  <a:pt x="2078726" y="15476"/>
-                  <a:pt x="1879817" y="18288"/>
-                </a:cubicBezTo>
-                <a:cubicBezTo>
-                  <a:pt x="1680908" y="21100"/>
-                  <a:pt x="1548770" y="-4127"/>
-                  <a:pt x="1318313" y="18288"/>
-                </a:cubicBezTo>
-                <a:cubicBezTo>
-                  <a:pt x="1087856" y="40703"/>
-                  <a:pt x="894613" y="3927"/>
-                  <a:pt x="659157" y="18288"/>
-                </a:cubicBezTo>
-                <a:cubicBezTo>
-                  <a:pt x="423701" y="32649"/>
-                  <a:pt x="246611" y="33975"/>
-                  <a:pt x="0" y="18288"/>
-                </a:cubicBezTo>
-                <a:cubicBezTo>
-                  <a:pt x="-348" y="10388"/>
-                  <a:pt x="-12" y="3969"/>
-                  <a:pt x="0" y="0"/>
-                </a:cubicBezTo>
-                <a:close/>
-              </a:path>
-            </a:pathLst>
-          </a:custGeom>
-          <a:solidFill>
-            <a:schemeClr val="accent2"/>
-          </a:solidFill>
-          <a:ln w="38100" cap="rnd">
-            <a:solidFill>
-              <a:schemeClr val="accent2"/>
-            </a:solidFill>
-            <a:round/>
-            <a:extLst>
-              <a:ext uri="{C807C97D-BFC1-408E-A445-0C87EB9F89A2}">
-                <ask:lineSketchStyleProps xmlns:ask="http://schemas.microsoft.com/office/drawing/2018/sketchyshapes" sd="1219033472">
-                  <a:prstGeom prst="rect">
-                    <a:avLst/>
-                  </a:prstGeom>
-                  <ask:type>
-                    <ask:lineSketchFreehand/>
-                  </ask:type>
-                </ask:lineSketchStyleProps>
-              </a:ext>
-            </a:extLst>
-          </a:ln>
-        </p:spPr>
-        <p:style>
-          <a:lnRef idx="2">
-            <a:schemeClr val="accent1">
-              <a:shade val="50000"/>
-            </a:schemeClr>
-          </a:lnRef>
-          <a:fillRef idx="1">
-            <a:schemeClr val="accent1"/>
-          </a:fillRef>
-          <a:effectRef idx="0">
-            <a:schemeClr val="accent1"/>
-          </a:effectRef>
-          <a:fontRef idx="minor">
-            <a:schemeClr val="lt1"/>
-          </a:fontRef>
-        </p:style>
-        <p:txBody>
-          <a:bodyPr rtlCol="0" anchor="ctr"/>
-          <a:lstStyle/>
-          <a:p>
-            <a:pPr algn="ctr"/>
-            <a:endParaRPr lang="en-US"/>
-          </a:p>
-        </p:txBody>
-      </p:sp>
-      <p:sp>
-        <p:nvSpPr>
-          <p:cNvPr id="3" name="Content Placeholder 2"/>
-          <p:cNvSpPr>
-            <a:spLocks noGrp="1"/>
-          </p:cNvSpPr>
-          <p:nvPr>
-            <p:ph idx="1"/>
-          </p:nvPr>
-        </p:nvSpPr>
-        <p:spPr>
-          <a:xfrm>
-            <a:off x="473202" y="2660904"/>
-            <a:ext cx="3935738" cy="3547872"/>
-          </a:xfrm>
-        </p:spPr>
-        <p:txBody>
-          <a:bodyPr anchor="t">
-            <a:normAutofit/>
-          </a:bodyPr>
-          <a:lstStyle/>
-          <a:p>
-            <a:pPr marL="0" indent="0">
-              <a:buNone/>
-            </a:pPr>
-            <a:r>
-              <a:rPr lang="hu-HU" sz="1900" b="1" dirty="0" err="1"/>
-              <a:t>HyperText</a:t>
-            </a:r>
-            <a:r>
-              <a:rPr lang="hu-HU" sz="1900" b="1" dirty="0"/>
-              <a:t> </a:t>
-            </a:r>
-            <a:r>
-              <a:rPr lang="hu-HU" sz="1900" b="1" dirty="0" err="1"/>
-              <a:t>Transfer</a:t>
-            </a:r>
-            <a:r>
-              <a:rPr lang="hu-HU" sz="1900" b="1" dirty="0"/>
-              <a:t> </a:t>
-            </a:r>
-            <a:r>
-              <a:rPr lang="hu-HU" sz="1900" b="1" dirty="0" err="1"/>
-              <a:t>Protocol</a:t>
-            </a:r>
-            <a:endParaRPr lang="hu-HU" sz="1900" b="1" dirty="0"/>
-          </a:p>
-          <a:p>
-            <a:r>
-              <a:rPr lang="hu-HU" sz="1900" dirty="0"/>
-              <a:t>Kliens–szerver alapú protokoll</a:t>
-            </a:r>
-          </a:p>
-          <a:p>
-            <a:r>
-              <a:rPr lang="hu-HU" sz="1900" dirty="0"/>
-              <a:t>TCP felett működik (alkalmazási rétegben)</a:t>
-            </a:r>
-          </a:p>
-          <a:p>
-            <a:r>
-              <a:rPr lang="hu-HU" sz="1900" dirty="0"/>
-              <a:t>Állapotmentes (minden kérés független)</a:t>
-            </a:r>
-          </a:p>
-          <a:p>
-            <a:r>
-              <a:rPr lang="hu-HU" sz="1900" dirty="0"/>
-              <a:t>Szöveges (Human-</a:t>
-            </a:r>
-            <a:r>
-              <a:rPr lang="hu-HU" sz="1900" dirty="0" err="1"/>
-              <a:t>readable</a:t>
-            </a:r>
-            <a:r>
-              <a:rPr lang="hu-HU" sz="1900" dirty="0"/>
-              <a:t>)</a:t>
-            </a:r>
-          </a:p>
-          <a:p>
-            <a:r>
-              <a:rPr lang="hu-HU" sz="1900" dirty="0"/>
-              <a:t>HTTP/1.1 a legelterjedtebb verzió</a:t>
-            </a:r>
-          </a:p>
-          <a:p>
-            <a:pPr marL="0" indent="0">
-              <a:buNone/>
-            </a:pPr>
-            <a:endParaRPr lang="hu-HU" sz="1900" dirty="0"/>
-          </a:p>
-        </p:txBody>
-      </p:sp>
-      <p:pic>
-        <p:nvPicPr>
-          <p:cNvPr id="5122" name="Picture 2">
-            <a:extLst>
-              <a:ext uri="{FF2B5EF4-FFF2-40B4-BE49-F238E27FC236}">
-                <a16:creationId xmlns:a16="http://schemas.microsoft.com/office/drawing/2014/main" id="{3A9DB95D-F48F-6FB9-116D-BA2A4C79743E}"/>
-              </a:ext>
-            </a:extLst>
-          </p:cNvPr>
-          <p:cNvPicPr>
-            <a:picLocks noChangeAspect="1" noChangeArrowheads="1"/>
-          </p:cNvPicPr>
-          <p:nvPr/>
-        </p:nvPicPr>
-        <p:blipFill>
-          <a:blip r:embed="rId3">
-            <a:extLst>
-              <a:ext uri="{28A0092B-C50C-407E-A947-70E740481C1C}">
-                <a14:useLocalDpi xmlns:a14="http://schemas.microsoft.com/office/drawing/2010/main" val="0"/>
-              </a:ext>
-            </a:extLst>
-          </a:blip>
-          <a:stretch>
-            <a:fillRect/>
-          </a:stretch>
-        </p:blipFill>
-        <p:spPr bwMode="auto">
-          <a:xfrm>
-            <a:off x="4732774" y="2343041"/>
-            <a:ext cx="3935738" cy="2263048"/>
-          </a:xfrm>
-          <a:prstGeom prst="rect">
-            <a:avLst/>
-          </a:prstGeom>
-          <a:noFill/>
-          <a:extLst>
-            <a:ext uri="{909E8E84-426E-40DD-AFC4-6F175D3DCCD1}">
-              <a14:hiddenFill xmlns:a14="http://schemas.microsoft.com/office/drawing/2010/main">
-                <a:solidFill>
-                  <a:srgbClr val="FFFFFF"/>
-                </a:solidFill>
-              </a14:hiddenFill>
-            </a:ext>
-          </a:extLst>
-        </p:spPr>
-      </p:pic>
-    </p:spTree>
-  </p:cSld>
-  <p:clrMapOvr>
-    <a:masterClrMapping/>
-  </p:clrMapOvr>
-</p:sld>
-</file>
-
-<file path=ppt/slides/slide20.xml><?xml version="1.0" encoding="utf-8"?>
+<file path=ppt/slides/slide21.xml><?xml version="1.0" encoding="utf-8"?>
 <p:sld xmlns:a="http://schemas.openxmlformats.org/drawingml/2006/main" xmlns:r="http://schemas.openxmlformats.org/officeDocument/2006/relationships" xmlns:p="http://schemas.openxmlformats.org/presentationml/2006/main">
   <p:cSld>
     <p:bg>
@@ -24114,6 +24788,529 @@
       </p:grpSpPr>
       <p:sp useBgFill="1">
         <p:nvSpPr>
+          <p:cNvPr id="5127" name="Rectangle 5126">
+            <a:extLst>
+              <a:ext uri="{FF2B5EF4-FFF2-40B4-BE49-F238E27FC236}">
+                <a16:creationId xmlns:a16="http://schemas.microsoft.com/office/drawing/2014/main" id="{743AA782-23D1-4521-8CAD-47662984AA08}"/>
+              </a:ext>
+              <a:ext uri="{C183D7F6-B498-43B3-948B-1728B52AA6E4}">
+                <adec:decorative xmlns:adec="http://schemas.microsoft.com/office/drawing/2017/decorative" val="1"/>
+              </a:ext>
+            </a:extLst>
+          </p:cNvPr>
+          <p:cNvSpPr>
+            <a:spLocks noGrp="1" noRot="1" noChangeAspect="1" noMove="1" noResize="1" noEditPoints="1" noAdjustHandles="1" noChangeArrowheads="1" noChangeShapeType="1" noTextEdit="1"/>
+          </p:cNvSpPr>
+          <p:nvPr>
+            <p:extLst>
+              <p:ext uri="{386F3935-93C4-4BCD-93E2-E3B085C9AB24}">
+                <p16:designElem xmlns:p16="http://schemas.microsoft.com/office/powerpoint/2015/main" val="1"/>
+              </p:ext>
+            </p:extLst>
+          </p:nvPr>
+        </p:nvSpPr>
+        <p:spPr>
+          <a:xfrm>
+            <a:off x="0" y="0"/>
+            <a:ext cx="9144000" cy="6858000"/>
+          </a:xfrm>
+          <a:prstGeom prst="rect">
+            <a:avLst/>
+          </a:prstGeom>
+          <a:ln>
+            <a:noFill/>
+          </a:ln>
+        </p:spPr>
+        <p:style>
+          <a:lnRef idx="2">
+            <a:schemeClr val="accent1">
+              <a:shade val="50000"/>
+            </a:schemeClr>
+          </a:lnRef>
+          <a:fillRef idx="1">
+            <a:schemeClr val="accent1"/>
+          </a:fillRef>
+          <a:effectRef idx="0">
+            <a:schemeClr val="accent1"/>
+          </a:effectRef>
+          <a:fontRef idx="minor">
+            <a:schemeClr val="lt1"/>
+          </a:fontRef>
+        </p:style>
+        <p:txBody>
+          <a:bodyPr rtlCol="0" anchor="ctr"/>
+          <a:lstStyle/>
+          <a:p>
+            <a:pPr algn="ctr"/>
+            <a:endParaRPr lang="en-US"/>
+          </a:p>
+        </p:txBody>
+      </p:sp>
+      <p:sp>
+        <p:nvSpPr>
+          <p:cNvPr id="2" name="Title 1"/>
+          <p:cNvSpPr>
+            <a:spLocks noGrp="1"/>
+          </p:cNvSpPr>
+          <p:nvPr>
+            <p:ph type="title"/>
+          </p:nvPr>
+        </p:nvSpPr>
+        <p:spPr>
+          <a:xfrm>
+            <a:off x="593782" y="611643"/>
+            <a:ext cx="4390199" cy="861546"/>
+          </a:xfrm>
+        </p:spPr>
+        <p:txBody>
+          <a:bodyPr anchor="b">
+            <a:normAutofit/>
+          </a:bodyPr>
+          <a:lstStyle/>
+          <a:p>
+            <a:pPr algn="l"/>
+            <a:r>
+              <a:rPr lang="en-US" sz="4700" dirty="0"/>
+              <a:t>Mi </a:t>
+            </a:r>
+            <a:r>
+              <a:rPr lang="en-US" sz="4700" dirty="0" err="1"/>
+              <a:t>az</a:t>
+            </a:r>
+            <a:r>
+              <a:rPr lang="en-US" sz="4700" dirty="0"/>
+              <a:t> a HTTP?</a:t>
+            </a:r>
+          </a:p>
+        </p:txBody>
+      </p:sp>
+      <p:sp>
+        <p:nvSpPr>
+          <p:cNvPr id="5129" name="sketch line">
+            <a:extLst>
+              <a:ext uri="{FF2B5EF4-FFF2-40B4-BE49-F238E27FC236}">
+                <a16:creationId xmlns:a16="http://schemas.microsoft.com/office/drawing/2014/main" id="{71877DBC-BB60-40F0-AC93-2ACDBAAE60CE}"/>
+              </a:ext>
+              <a:ext uri="{C183D7F6-B498-43B3-948B-1728B52AA6E4}">
+                <adec:decorative xmlns:adec="http://schemas.microsoft.com/office/drawing/2017/decorative" val="1"/>
+              </a:ext>
+            </a:extLst>
+          </p:cNvPr>
+          <p:cNvSpPr>
+            <a:spLocks noGrp="1" noRot="1" noChangeAspect="1" noMove="1" noResize="1" noEditPoints="1" noAdjustHandles="1" noChangeArrowheads="1" noChangeShapeType="1" noTextEdit="1"/>
+          </p:cNvSpPr>
+          <p:nvPr>
+            <p:extLst>
+              <p:ext uri="{386F3935-93C4-4BCD-93E2-E3B085C9AB24}">
+                <p16:designElem xmlns:p16="http://schemas.microsoft.com/office/powerpoint/2015/main" val="1"/>
+              </p:ext>
+            </p:extLst>
+          </p:nvPr>
+        </p:nvSpPr>
+        <p:spPr>
+          <a:xfrm>
+            <a:off x="482458" y="2372868"/>
+            <a:ext cx="2441321" cy="18288"/>
+          </a:xfrm>
+          <a:custGeom>
+            <a:avLst/>
+            <a:gdLst>
+              <a:gd name="csX0" fmla="*/ 0 w 2441321"/>
+              <a:gd name="csY0" fmla="*/ 0 h 18288"/>
+              <a:gd name="csX1" fmla="*/ 585917 w 2441321"/>
+              <a:gd name="csY1" fmla="*/ 0 h 18288"/>
+              <a:gd name="csX2" fmla="*/ 1196247 w 2441321"/>
+              <a:gd name="csY2" fmla="*/ 0 h 18288"/>
+              <a:gd name="csX3" fmla="*/ 1806578 w 2441321"/>
+              <a:gd name="csY3" fmla="*/ 0 h 18288"/>
+              <a:gd name="csX4" fmla="*/ 2441321 w 2441321"/>
+              <a:gd name="csY4" fmla="*/ 0 h 18288"/>
+              <a:gd name="csX5" fmla="*/ 2441321 w 2441321"/>
+              <a:gd name="csY5" fmla="*/ 18288 h 18288"/>
+              <a:gd name="csX6" fmla="*/ 1830991 w 2441321"/>
+              <a:gd name="csY6" fmla="*/ 18288 h 18288"/>
+              <a:gd name="csX7" fmla="*/ 1269487 w 2441321"/>
+              <a:gd name="csY7" fmla="*/ 18288 h 18288"/>
+              <a:gd name="csX8" fmla="*/ 707983 w 2441321"/>
+              <a:gd name="csY8" fmla="*/ 18288 h 18288"/>
+              <a:gd name="csX9" fmla="*/ 0 w 2441321"/>
+              <a:gd name="csY9" fmla="*/ 18288 h 18288"/>
+              <a:gd name="csX10" fmla="*/ 0 w 2441321"/>
+              <a:gd name="csY10" fmla="*/ 0 h 18288"/>
+            </a:gdLst>
+            <a:ahLst/>
+            <a:cxnLst>
+              <a:cxn ang="0">
+                <a:pos x="csX0" y="csY0"/>
+              </a:cxn>
+              <a:cxn ang="0">
+                <a:pos x="csX1" y="csY1"/>
+              </a:cxn>
+              <a:cxn ang="0">
+                <a:pos x="csX2" y="csY2"/>
+              </a:cxn>
+              <a:cxn ang="0">
+                <a:pos x="csX3" y="csY3"/>
+              </a:cxn>
+              <a:cxn ang="0">
+                <a:pos x="csX4" y="csY4"/>
+              </a:cxn>
+              <a:cxn ang="0">
+                <a:pos x="csX5" y="csY5"/>
+              </a:cxn>
+              <a:cxn ang="0">
+                <a:pos x="csX6" y="csY6"/>
+              </a:cxn>
+              <a:cxn ang="0">
+                <a:pos x="csX7" y="csY7"/>
+              </a:cxn>
+              <a:cxn ang="0">
+                <a:pos x="csX8" y="csY8"/>
+              </a:cxn>
+              <a:cxn ang="0">
+                <a:pos x="csX9" y="csY9"/>
+              </a:cxn>
+              <a:cxn ang="0">
+                <a:pos x="csX10" y="csY10"/>
+              </a:cxn>
+            </a:cxnLst>
+            <a:rect l="l" t="t" r="r" b="b"/>
+            <a:pathLst>
+              <a:path w="2441321" h="18288" fill="none" extrusionOk="0">
+                <a:moveTo>
+                  <a:pt x="0" y="0"/>
+                </a:moveTo>
+                <a:cubicBezTo>
+                  <a:pt x="273217" y="-17533"/>
+                  <a:pt x="355785" y="-4171"/>
+                  <a:pt x="585917" y="0"/>
+                </a:cubicBezTo>
+                <a:cubicBezTo>
+                  <a:pt x="816049" y="4171"/>
+                  <a:pt x="991446" y="-9419"/>
+                  <a:pt x="1196247" y="0"/>
+                </a:cubicBezTo>
+                <a:cubicBezTo>
+                  <a:pt x="1401048" y="9419"/>
+                  <a:pt x="1589984" y="-731"/>
+                  <a:pt x="1806578" y="0"/>
+                </a:cubicBezTo>
+                <a:cubicBezTo>
+                  <a:pt x="2023172" y="731"/>
+                  <a:pt x="2247754" y="8393"/>
+                  <a:pt x="2441321" y="0"/>
+                </a:cubicBezTo>
+                <a:cubicBezTo>
+                  <a:pt x="2441167" y="8655"/>
+                  <a:pt x="2440437" y="9975"/>
+                  <a:pt x="2441321" y="18288"/>
+                </a:cubicBezTo>
+                <a:cubicBezTo>
+                  <a:pt x="2169723" y="30506"/>
+                  <a:pt x="2045712" y="39140"/>
+                  <a:pt x="1830991" y="18288"/>
+                </a:cubicBezTo>
+                <a:cubicBezTo>
+                  <a:pt x="1616270" y="-2564"/>
+                  <a:pt x="1505876" y="3949"/>
+                  <a:pt x="1269487" y="18288"/>
+                </a:cubicBezTo>
+                <a:cubicBezTo>
+                  <a:pt x="1033098" y="32627"/>
+                  <a:pt x="908661" y="41191"/>
+                  <a:pt x="707983" y="18288"/>
+                </a:cubicBezTo>
+                <a:cubicBezTo>
+                  <a:pt x="507305" y="-4615"/>
+                  <a:pt x="333592" y="20759"/>
+                  <a:pt x="0" y="18288"/>
+                </a:cubicBezTo>
+                <a:cubicBezTo>
+                  <a:pt x="-688" y="11716"/>
+                  <a:pt x="875" y="6357"/>
+                  <a:pt x="0" y="0"/>
+                </a:cubicBezTo>
+                <a:close/>
+              </a:path>
+              <a:path w="2441321" h="18288" stroke="0" extrusionOk="0">
+                <a:moveTo>
+                  <a:pt x="0" y="0"/>
+                </a:moveTo>
+                <a:cubicBezTo>
+                  <a:pt x="207071" y="-14617"/>
+                  <a:pt x="444194" y="-15606"/>
+                  <a:pt x="585917" y="0"/>
+                </a:cubicBezTo>
+                <a:cubicBezTo>
+                  <a:pt x="727640" y="15606"/>
+                  <a:pt x="904326" y="-79"/>
+                  <a:pt x="1123008" y="0"/>
+                </a:cubicBezTo>
+                <a:cubicBezTo>
+                  <a:pt x="1341690" y="79"/>
+                  <a:pt x="1600014" y="10401"/>
+                  <a:pt x="1782164" y="0"/>
+                </a:cubicBezTo>
+                <a:cubicBezTo>
+                  <a:pt x="1964314" y="-10401"/>
+                  <a:pt x="2143537" y="-21488"/>
+                  <a:pt x="2441321" y="0"/>
+                </a:cubicBezTo>
+                <a:cubicBezTo>
+                  <a:pt x="2441735" y="5928"/>
+                  <a:pt x="2441551" y="11133"/>
+                  <a:pt x="2441321" y="18288"/>
+                </a:cubicBezTo>
+                <a:cubicBezTo>
+                  <a:pt x="2166745" y="28773"/>
+                  <a:pt x="2078726" y="15476"/>
+                  <a:pt x="1879817" y="18288"/>
+                </a:cubicBezTo>
+                <a:cubicBezTo>
+                  <a:pt x="1680908" y="21100"/>
+                  <a:pt x="1548770" y="-4127"/>
+                  <a:pt x="1318313" y="18288"/>
+                </a:cubicBezTo>
+                <a:cubicBezTo>
+                  <a:pt x="1087856" y="40703"/>
+                  <a:pt x="894613" y="3927"/>
+                  <a:pt x="659157" y="18288"/>
+                </a:cubicBezTo>
+                <a:cubicBezTo>
+                  <a:pt x="423701" y="32649"/>
+                  <a:pt x="246611" y="33975"/>
+                  <a:pt x="0" y="18288"/>
+                </a:cubicBezTo>
+                <a:cubicBezTo>
+                  <a:pt x="-348" y="10388"/>
+                  <a:pt x="-12" y="3969"/>
+                  <a:pt x="0" y="0"/>
+                </a:cubicBezTo>
+                <a:close/>
+              </a:path>
+            </a:pathLst>
+          </a:custGeom>
+          <a:solidFill>
+            <a:schemeClr val="accent2"/>
+          </a:solidFill>
+          <a:ln w="38100" cap="rnd">
+            <a:solidFill>
+              <a:schemeClr val="accent2"/>
+            </a:solidFill>
+            <a:round/>
+            <a:extLst>
+              <a:ext uri="{C807C97D-BFC1-408E-A445-0C87EB9F89A2}">
+                <ask:lineSketchStyleProps xmlns:ask="http://schemas.microsoft.com/office/drawing/2018/sketchyshapes" sd="1219033472">
+                  <a:prstGeom prst="rect">
+                    <a:avLst/>
+                  </a:prstGeom>
+                  <ask:type>
+                    <ask:lineSketchFreehand/>
+                  </ask:type>
+                </ask:lineSketchStyleProps>
+              </a:ext>
+            </a:extLst>
+          </a:ln>
+        </p:spPr>
+        <p:style>
+          <a:lnRef idx="2">
+            <a:schemeClr val="accent1">
+              <a:shade val="50000"/>
+            </a:schemeClr>
+          </a:lnRef>
+          <a:fillRef idx="1">
+            <a:schemeClr val="accent1"/>
+          </a:fillRef>
+          <a:effectRef idx="0">
+            <a:schemeClr val="accent1"/>
+          </a:effectRef>
+          <a:fontRef idx="minor">
+            <a:schemeClr val="lt1"/>
+          </a:fontRef>
+        </p:style>
+        <p:txBody>
+          <a:bodyPr rtlCol="0" anchor="ctr"/>
+          <a:lstStyle/>
+          <a:p>
+            <a:pPr algn="ctr"/>
+            <a:endParaRPr lang="en-US"/>
+          </a:p>
+        </p:txBody>
+      </p:sp>
+      <p:sp>
+        <p:nvSpPr>
+          <p:cNvPr id="3" name="Content Placeholder 2"/>
+          <p:cNvSpPr>
+            <a:spLocks noGrp="1"/>
+          </p:cNvSpPr>
+          <p:nvPr>
+            <p:ph idx="1"/>
+          </p:nvPr>
+        </p:nvSpPr>
+        <p:spPr>
+          <a:xfrm>
+            <a:off x="473202" y="2660904"/>
+            <a:ext cx="3935738" cy="3547872"/>
+          </a:xfrm>
+        </p:spPr>
+        <p:txBody>
+          <a:bodyPr anchor="t">
+            <a:normAutofit/>
+          </a:bodyPr>
+          <a:lstStyle/>
+          <a:p>
+            <a:pPr marL="0" indent="0">
+              <a:buNone/>
+            </a:pPr>
+            <a:r>
+              <a:rPr lang="hu-HU" sz="1900" b="1" dirty="0" err="1"/>
+              <a:t>HyperText</a:t>
+            </a:r>
+            <a:r>
+              <a:rPr lang="hu-HU" sz="1900" b="1" dirty="0"/>
+              <a:t> </a:t>
+            </a:r>
+            <a:r>
+              <a:rPr lang="hu-HU" sz="1900" b="1" dirty="0" err="1"/>
+              <a:t>Transfer</a:t>
+            </a:r>
+            <a:r>
+              <a:rPr lang="hu-HU" sz="1900" b="1" dirty="0"/>
+              <a:t> </a:t>
+            </a:r>
+            <a:r>
+              <a:rPr lang="hu-HU" sz="1900" b="1" dirty="0" err="1"/>
+              <a:t>Protocol</a:t>
+            </a:r>
+            <a:endParaRPr lang="hu-HU" sz="1900" b="1" dirty="0"/>
+          </a:p>
+          <a:p>
+            <a:r>
+              <a:rPr lang="hu-HU" sz="1900" dirty="0"/>
+              <a:t>Kliens–szerver alapú protokoll</a:t>
+            </a:r>
+          </a:p>
+          <a:p>
+            <a:r>
+              <a:rPr lang="hu-HU" sz="1900" dirty="0"/>
+              <a:t>TCP felett működik (alkalmazási rétegben)</a:t>
+            </a:r>
+          </a:p>
+          <a:p>
+            <a:r>
+              <a:rPr lang="hu-HU" sz="1900" dirty="0"/>
+              <a:t>Állapotmentes (minden kérés független)</a:t>
+            </a:r>
+          </a:p>
+          <a:p>
+            <a:r>
+              <a:rPr lang="hu-HU" sz="1900" dirty="0"/>
+              <a:t>Szöveges (Human-</a:t>
+            </a:r>
+            <a:r>
+              <a:rPr lang="hu-HU" sz="1900" dirty="0" err="1"/>
+              <a:t>readable</a:t>
+            </a:r>
+            <a:r>
+              <a:rPr lang="hu-HU" sz="1900" dirty="0"/>
+              <a:t>)</a:t>
+            </a:r>
+          </a:p>
+          <a:p>
+            <a:r>
+              <a:rPr lang="hu-HU" sz="1900" dirty="0"/>
+              <a:t>HTTP/1.1 a legelterjedtebb verzió</a:t>
+            </a:r>
+          </a:p>
+          <a:p>
+            <a:pPr marL="0" indent="0">
+              <a:buNone/>
+            </a:pPr>
+            <a:endParaRPr lang="hu-HU" sz="1900" dirty="0"/>
+          </a:p>
+        </p:txBody>
+      </p:sp>
+      <p:pic>
+        <p:nvPicPr>
+          <p:cNvPr id="5122" name="Picture 2">
+            <a:extLst>
+              <a:ext uri="{FF2B5EF4-FFF2-40B4-BE49-F238E27FC236}">
+                <a16:creationId xmlns:a16="http://schemas.microsoft.com/office/drawing/2014/main" id="{3A9DB95D-F48F-6FB9-116D-BA2A4C79743E}"/>
+              </a:ext>
+            </a:extLst>
+          </p:cNvPr>
+          <p:cNvPicPr>
+            <a:picLocks noChangeAspect="1" noChangeArrowheads="1"/>
+          </p:cNvPicPr>
+          <p:nvPr/>
+        </p:nvPicPr>
+        <p:blipFill>
+          <a:blip r:embed="rId3">
+            <a:extLst>
+              <a:ext uri="{28A0092B-C50C-407E-A947-70E740481C1C}">
+                <a14:useLocalDpi xmlns:a14="http://schemas.microsoft.com/office/drawing/2010/main" val="0"/>
+              </a:ext>
+            </a:extLst>
+          </a:blip>
+          <a:stretch>
+            <a:fillRect/>
+          </a:stretch>
+        </p:blipFill>
+        <p:spPr bwMode="auto">
+          <a:xfrm>
+            <a:off x="4732774" y="2343041"/>
+            <a:ext cx="3935738" cy="2263048"/>
+          </a:xfrm>
+          <a:prstGeom prst="rect">
+            <a:avLst/>
+          </a:prstGeom>
+          <a:noFill/>
+          <a:extLst>
+            <a:ext uri="{909E8E84-426E-40DD-AFC4-6F175D3DCCD1}">
+              <a14:hiddenFill xmlns:a14="http://schemas.microsoft.com/office/drawing/2010/main">
+                <a:solidFill>
+                  <a:srgbClr val="FFFFFF"/>
+                </a:solidFill>
+              </a14:hiddenFill>
+            </a:ext>
+          </a:extLst>
+        </p:spPr>
+      </p:pic>
+    </p:spTree>
+  </p:cSld>
+  <p:clrMapOvr>
+    <a:masterClrMapping/>
+  </p:clrMapOvr>
+</p:sld>
+</file>
+
+<file path=ppt/slides/slide4.xml><?xml version="1.0" encoding="utf-8"?>
+<p:sld xmlns:a="http://schemas.openxmlformats.org/drawingml/2006/main" xmlns:r="http://schemas.openxmlformats.org/officeDocument/2006/relationships" xmlns:p="http://schemas.openxmlformats.org/presentationml/2006/main">
+  <p:cSld>
+    <p:bg>
+      <p:bgPr>
+        <a:solidFill>
+          <a:schemeClr val="bg1"/>
+        </a:solidFill>
+        <a:effectLst/>
+      </p:bgPr>
+    </p:bg>
+    <p:spTree>
+      <p:nvGrpSpPr>
+        <p:cNvPr id="1" name=""/>
+        <p:cNvGrpSpPr/>
+        <p:nvPr/>
+      </p:nvGrpSpPr>
+      <p:grpSpPr>
+        <a:xfrm>
+          <a:off x="0" y="0"/>
+          <a:ext cx="0" cy="0"/>
+          <a:chOff x="0" y="0"/>
+          <a:chExt cx="0" cy="0"/>
+        </a:xfrm>
+      </p:grpSpPr>
+      <p:sp useBgFill="1">
+        <p:nvSpPr>
           <p:cNvPr id="21" name="Rectangle 20">
             <a:extLst>
               <a:ext uri="{FF2B5EF4-FFF2-40B4-BE49-F238E27FC236}">
@@ -24841,7 +26038,7 @@
 </p:sld>
 </file>
 
-<file path=ppt/slides/slide4.xml><?xml version="1.0" encoding="utf-8"?>
+<file path=ppt/slides/slide5.xml><?xml version="1.0" encoding="utf-8"?>
 <p:sld xmlns:a="http://schemas.openxmlformats.org/drawingml/2006/main" xmlns:r="http://schemas.openxmlformats.org/officeDocument/2006/relationships" xmlns:p="http://schemas.openxmlformats.org/presentationml/2006/main">
   <p:cSld>
     <p:bg>
@@ -25674,7 +26871,7 @@
 </p:sld>
 </file>
 
-<file path=ppt/slides/slide5.xml><?xml version="1.0" encoding="utf-8"?>
+<file path=ppt/slides/slide6.xml><?xml version="1.0" encoding="utf-8"?>
 <p:sld xmlns:a="http://schemas.openxmlformats.org/drawingml/2006/main" xmlns:r="http://schemas.openxmlformats.org/officeDocument/2006/relationships" xmlns:p="http://schemas.openxmlformats.org/presentationml/2006/main">
   <p:cSld>
     <p:bg>
@@ -26377,7 +27574,7 @@
 </p:sld>
 </file>
 
-<file path=ppt/slides/slide6.xml><?xml version="1.0" encoding="utf-8"?>
+<file path=ppt/slides/slide7.xml><?xml version="1.0" encoding="utf-8"?>
 <p:sld xmlns:a="http://schemas.openxmlformats.org/drawingml/2006/main" xmlns:r="http://schemas.openxmlformats.org/officeDocument/2006/relationships" xmlns:p="http://schemas.openxmlformats.org/presentationml/2006/main">
   <p:cSld>
     <p:bg>
@@ -27079,7 +28276,7 @@
 </p:sld>
 </file>
 
-<file path=ppt/slides/slide7.xml><?xml version="1.0" encoding="utf-8"?>
+<file path=ppt/slides/slide8.xml><?xml version="1.0" encoding="utf-8"?>
 <p:sld xmlns:a="http://schemas.openxmlformats.org/drawingml/2006/main" xmlns:r="http://schemas.openxmlformats.org/officeDocument/2006/relationships" xmlns:p="http://schemas.openxmlformats.org/presentationml/2006/main">
   <p:cSld>
     <p:bg>
@@ -27826,7 +29023,7 @@
 </p:sld>
 </file>
 
-<file path=ppt/slides/slide8.xml><?xml version="1.0" encoding="utf-8"?>
+<file path=ppt/slides/slide9.xml><?xml version="1.0" encoding="utf-8"?>
 <p:sld xmlns:a="http://schemas.openxmlformats.org/drawingml/2006/main" xmlns:r="http://schemas.openxmlformats.org/officeDocument/2006/relationships" xmlns:p="http://schemas.openxmlformats.org/presentationml/2006/main">
   <p:cSld>
     <p:bg>
@@ -28844,1034 +30041,6 @@
                 <a:latin typeface="Arial" panose="020B0604020202020204" pitchFamily="34" charset="0"/>
               </a:rPr>
               <a:t> – elérhető opciók és műveletek lekérdezése</a:t>
-            </a:r>
-            <a:endParaRPr kumimoji="0" lang="en-US" altLang="en-US" sz="2400" b="0" i="0" u="none" strike="noStrike" cap="none" normalizeH="0" baseline="0" dirty="0">
-              <a:ln>
-                <a:noFill/>
-              </a:ln>
-              <a:effectLst/>
-              <a:latin typeface="Arial" panose="020B0604020202020204" pitchFamily="34" charset="0"/>
-            </a:endParaRPr>
-          </a:p>
-        </p:txBody>
-      </p:sp>
-    </p:spTree>
-  </p:cSld>
-  <p:clrMapOvr>
-    <a:masterClrMapping/>
-  </p:clrMapOvr>
-</p:sld>
-</file>
-
-<file path=ppt/slides/slide9.xml><?xml version="1.0" encoding="utf-8"?>
-<p:sld xmlns:a="http://schemas.openxmlformats.org/drawingml/2006/main" xmlns:r="http://schemas.openxmlformats.org/officeDocument/2006/relationships" xmlns:p="http://schemas.openxmlformats.org/presentationml/2006/main">
-  <p:cSld>
-    <p:bg>
-      <p:bgPr>
-        <a:solidFill>
-          <a:schemeClr val="bg1"/>
-        </a:solidFill>
-        <a:effectLst/>
-      </p:bgPr>
-    </p:bg>
-    <p:spTree>
-      <p:nvGrpSpPr>
-        <p:cNvPr id="1" name=""/>
-        <p:cNvGrpSpPr/>
-        <p:nvPr/>
-      </p:nvGrpSpPr>
-      <p:grpSpPr>
-        <a:xfrm>
-          <a:off x="0" y="0"/>
-          <a:ext cx="0" cy="0"/>
-          <a:chOff x="0" y="0"/>
-          <a:chExt cx="0" cy="0"/>
-        </a:xfrm>
-      </p:grpSpPr>
-      <p:sp useBgFill="1">
-        <p:nvSpPr>
-          <p:cNvPr id="9" name="Rectangle 8">
-            <a:extLst>
-              <a:ext uri="{FF2B5EF4-FFF2-40B4-BE49-F238E27FC236}">
-                <a16:creationId xmlns:a16="http://schemas.microsoft.com/office/drawing/2014/main" id="{100EDD19-6802-4EC3-95CE-CFFAB042CFD6}"/>
-              </a:ext>
-              <a:ext uri="{C183D7F6-B498-43B3-948B-1728B52AA6E4}">
-                <adec:decorative xmlns:adec="http://schemas.microsoft.com/office/drawing/2017/decorative" val="1"/>
-              </a:ext>
-            </a:extLst>
-          </p:cNvPr>
-          <p:cNvSpPr>
-            <a:spLocks noGrp="1" noRot="1" noChangeAspect="1" noMove="1" noResize="1" noEditPoints="1" noAdjustHandles="1" noChangeArrowheads="1" noChangeShapeType="1" noTextEdit="1"/>
-          </p:cNvSpPr>
-          <p:nvPr>
-            <p:extLst>
-              <p:ext uri="{386F3935-93C4-4BCD-93E2-E3B085C9AB24}">
-                <p16:designElem xmlns:p16="http://schemas.microsoft.com/office/powerpoint/2015/main" val="1"/>
-              </p:ext>
-            </p:extLst>
-          </p:nvPr>
-        </p:nvSpPr>
-        <p:spPr>
-          <a:xfrm>
-            <a:off x="0" y="0"/>
-            <a:ext cx="9141714" cy="6858000"/>
-          </a:xfrm>
-          <a:prstGeom prst="rect">
-            <a:avLst/>
-          </a:prstGeom>
-          <a:ln>
-            <a:noFill/>
-          </a:ln>
-        </p:spPr>
-        <p:style>
-          <a:lnRef idx="2">
-            <a:schemeClr val="accent1">
-              <a:shade val="50000"/>
-            </a:schemeClr>
-          </a:lnRef>
-          <a:fillRef idx="1">
-            <a:schemeClr val="accent1"/>
-          </a:fillRef>
-          <a:effectRef idx="0">
-            <a:schemeClr val="accent1"/>
-          </a:effectRef>
-          <a:fontRef idx="minor">
-            <a:schemeClr val="lt1"/>
-          </a:fontRef>
-        </p:style>
-        <p:txBody>
-          <a:bodyPr rtlCol="0" anchor="ctr"/>
-          <a:lstStyle/>
-          <a:p>
-            <a:pPr algn="ctr"/>
-            <a:endParaRPr lang="en-US"/>
-          </a:p>
-        </p:txBody>
-      </p:sp>
-      <p:sp>
-        <p:nvSpPr>
-          <p:cNvPr id="2" name="Title 1"/>
-          <p:cNvSpPr>
-            <a:spLocks noGrp="1"/>
-          </p:cNvSpPr>
-          <p:nvPr>
-            <p:ph type="title"/>
-          </p:nvPr>
-        </p:nvSpPr>
-        <p:spPr>
-          <a:xfrm>
-            <a:off x="628650" y="365125"/>
-            <a:ext cx="7886700" cy="1060237"/>
-          </a:xfrm>
-        </p:spPr>
-        <p:txBody>
-          <a:bodyPr>
-            <a:normAutofit/>
-          </a:bodyPr>
-          <a:lstStyle/>
-          <a:p>
-            <a:r>
-              <a:rPr lang="en-US" sz="4700" dirty="0"/>
-              <a:t>GET </a:t>
-            </a:r>
-            <a:r>
-              <a:rPr lang="en-US" sz="4700" dirty="0" err="1"/>
-              <a:t>metódus</a:t>
-            </a:r>
-            <a:endParaRPr lang="en-US" sz="4700" dirty="0"/>
-          </a:p>
-        </p:txBody>
-      </p:sp>
-      <p:sp>
-        <p:nvSpPr>
-          <p:cNvPr id="11" name="sketch line">
-            <a:extLst>
-              <a:ext uri="{FF2B5EF4-FFF2-40B4-BE49-F238E27FC236}">
-                <a16:creationId xmlns:a16="http://schemas.microsoft.com/office/drawing/2014/main" id="{DB17E863-922E-4C26-BD64-E8FD41D28661}"/>
-              </a:ext>
-              <a:ext uri="{C183D7F6-B498-43B3-948B-1728B52AA6E4}">
-                <adec:decorative xmlns:adec="http://schemas.microsoft.com/office/drawing/2017/decorative" val="1"/>
-              </a:ext>
-            </a:extLst>
-          </p:cNvPr>
-          <p:cNvSpPr>
-            <a:spLocks noGrp="1" noRot="1" noChangeAspect="1" noMove="1" noResize="1" noEditPoints="1" noAdjustHandles="1" noChangeArrowheads="1" noChangeShapeType="1" noTextEdit="1"/>
-          </p:cNvSpPr>
-          <p:nvPr>
-            <p:extLst>
-              <p:ext uri="{386F3935-93C4-4BCD-93E2-E3B085C9AB24}">
-                <p16:designElem xmlns:p16="http://schemas.microsoft.com/office/powerpoint/2015/main" val="1"/>
-              </p:ext>
-            </p:extLst>
-          </p:nvPr>
-        </p:nvSpPr>
-        <p:spPr>
-          <a:xfrm>
-            <a:off x="501777" y="1677373"/>
-            <a:ext cx="8140446" cy="18288"/>
-          </a:xfrm>
-          <a:custGeom>
-            <a:avLst/>
-            <a:gdLst>
-              <a:gd name="csX0" fmla="*/ 0 w 8140446"/>
-              <a:gd name="csY0" fmla="*/ 0 h 18288"/>
-              <a:gd name="csX1" fmla="*/ 434157 w 8140446"/>
-              <a:gd name="csY1" fmla="*/ 0 h 18288"/>
-              <a:gd name="csX2" fmla="*/ 1193932 w 8140446"/>
-              <a:gd name="csY2" fmla="*/ 0 h 18288"/>
-              <a:gd name="csX3" fmla="*/ 1628089 w 8140446"/>
-              <a:gd name="csY3" fmla="*/ 0 h 18288"/>
-              <a:gd name="csX4" fmla="*/ 2225055 w 8140446"/>
-              <a:gd name="csY4" fmla="*/ 0 h 18288"/>
-              <a:gd name="csX5" fmla="*/ 3066235 w 8140446"/>
-              <a:gd name="csY5" fmla="*/ 0 h 18288"/>
-              <a:gd name="csX6" fmla="*/ 3744605 w 8140446"/>
-              <a:gd name="csY6" fmla="*/ 0 h 18288"/>
-              <a:gd name="csX7" fmla="*/ 4504380 w 8140446"/>
-              <a:gd name="csY7" fmla="*/ 0 h 18288"/>
-              <a:gd name="csX8" fmla="*/ 5101346 w 8140446"/>
-              <a:gd name="csY8" fmla="*/ 0 h 18288"/>
-              <a:gd name="csX9" fmla="*/ 5779717 w 8140446"/>
-              <a:gd name="csY9" fmla="*/ 0 h 18288"/>
-              <a:gd name="csX10" fmla="*/ 6620896 w 8140446"/>
-              <a:gd name="csY10" fmla="*/ 0 h 18288"/>
-              <a:gd name="csX11" fmla="*/ 7136458 w 8140446"/>
-              <a:gd name="csY11" fmla="*/ 0 h 18288"/>
-              <a:gd name="csX12" fmla="*/ 8140446 w 8140446"/>
-              <a:gd name="csY12" fmla="*/ 0 h 18288"/>
-              <a:gd name="csX13" fmla="*/ 8140446 w 8140446"/>
-              <a:gd name="csY13" fmla="*/ 18288 h 18288"/>
-              <a:gd name="csX14" fmla="*/ 7543480 w 8140446"/>
-              <a:gd name="csY14" fmla="*/ 18288 h 18288"/>
-              <a:gd name="csX15" fmla="*/ 7109323 w 8140446"/>
-              <a:gd name="csY15" fmla="*/ 18288 h 18288"/>
-              <a:gd name="csX16" fmla="*/ 6430952 w 8140446"/>
-              <a:gd name="csY16" fmla="*/ 18288 h 18288"/>
-              <a:gd name="csX17" fmla="*/ 5915391 w 8140446"/>
-              <a:gd name="csY17" fmla="*/ 18288 h 18288"/>
-              <a:gd name="csX18" fmla="*/ 5237020 w 8140446"/>
-              <a:gd name="csY18" fmla="*/ 18288 h 18288"/>
-              <a:gd name="csX19" fmla="*/ 4558650 w 8140446"/>
-              <a:gd name="csY19" fmla="*/ 18288 h 18288"/>
-              <a:gd name="csX20" fmla="*/ 3880279 w 8140446"/>
-              <a:gd name="csY20" fmla="*/ 18288 h 18288"/>
-              <a:gd name="csX21" fmla="*/ 3201909 w 8140446"/>
-              <a:gd name="csY21" fmla="*/ 18288 h 18288"/>
-              <a:gd name="csX22" fmla="*/ 2604943 w 8140446"/>
-              <a:gd name="csY22" fmla="*/ 18288 h 18288"/>
-              <a:gd name="csX23" fmla="*/ 1845168 w 8140446"/>
-              <a:gd name="csY23" fmla="*/ 18288 h 18288"/>
-              <a:gd name="csX24" fmla="*/ 1166797 w 8140446"/>
-              <a:gd name="csY24" fmla="*/ 18288 h 18288"/>
-              <a:gd name="csX25" fmla="*/ 0 w 8140446"/>
-              <a:gd name="csY25" fmla="*/ 18288 h 18288"/>
-              <a:gd name="csX26" fmla="*/ 0 w 8140446"/>
-              <a:gd name="csY26" fmla="*/ 0 h 18288"/>
-            </a:gdLst>
-            <a:ahLst/>
-            <a:cxnLst>
-              <a:cxn ang="0">
-                <a:pos x="csX0" y="csY0"/>
-              </a:cxn>
-              <a:cxn ang="0">
-                <a:pos x="csX1" y="csY1"/>
-              </a:cxn>
-              <a:cxn ang="0">
-                <a:pos x="csX2" y="csY2"/>
-              </a:cxn>
-              <a:cxn ang="0">
-                <a:pos x="csX3" y="csY3"/>
-              </a:cxn>
-              <a:cxn ang="0">
-                <a:pos x="csX4" y="csY4"/>
-              </a:cxn>
-              <a:cxn ang="0">
-                <a:pos x="csX5" y="csY5"/>
-              </a:cxn>
-              <a:cxn ang="0">
-                <a:pos x="csX6" y="csY6"/>
-              </a:cxn>
-              <a:cxn ang="0">
-                <a:pos x="csX7" y="csY7"/>
-              </a:cxn>
-              <a:cxn ang="0">
-                <a:pos x="csX8" y="csY8"/>
-              </a:cxn>
-              <a:cxn ang="0">
-                <a:pos x="csX9" y="csY9"/>
-              </a:cxn>
-              <a:cxn ang="0">
-                <a:pos x="csX10" y="csY10"/>
-              </a:cxn>
-              <a:cxn ang="0">
-                <a:pos x="csX11" y="csY11"/>
-              </a:cxn>
-              <a:cxn ang="0">
-                <a:pos x="csX12" y="csY12"/>
-              </a:cxn>
-              <a:cxn ang="0">
-                <a:pos x="csX13" y="csY13"/>
-              </a:cxn>
-              <a:cxn ang="0">
-                <a:pos x="csX14" y="csY14"/>
-              </a:cxn>
-              <a:cxn ang="0">
-                <a:pos x="csX15" y="csY15"/>
-              </a:cxn>
-              <a:cxn ang="0">
-                <a:pos x="csX16" y="csY16"/>
-              </a:cxn>
-              <a:cxn ang="0">
-                <a:pos x="csX17" y="csY17"/>
-              </a:cxn>
-              <a:cxn ang="0">
-                <a:pos x="csX18" y="csY18"/>
-              </a:cxn>
-              <a:cxn ang="0">
-                <a:pos x="csX19" y="csY19"/>
-              </a:cxn>
-              <a:cxn ang="0">
-                <a:pos x="csX20" y="csY20"/>
-              </a:cxn>
-              <a:cxn ang="0">
-                <a:pos x="csX21" y="csY21"/>
-              </a:cxn>
-              <a:cxn ang="0">
-                <a:pos x="csX22" y="csY22"/>
-              </a:cxn>
-              <a:cxn ang="0">
-                <a:pos x="csX23" y="csY23"/>
-              </a:cxn>
-              <a:cxn ang="0">
-                <a:pos x="csX24" y="csY24"/>
-              </a:cxn>
-              <a:cxn ang="0">
-                <a:pos x="csX25" y="csY25"/>
-              </a:cxn>
-              <a:cxn ang="0">
-                <a:pos x="csX26" y="csY26"/>
-              </a:cxn>
-            </a:cxnLst>
-            <a:rect l="l" t="t" r="r" b="b"/>
-            <a:pathLst>
-              <a:path w="8140446" h="18288" fill="none" extrusionOk="0">
-                <a:moveTo>
-                  <a:pt x="0" y="0"/>
-                </a:moveTo>
-                <a:cubicBezTo>
-                  <a:pt x="94920" y="9103"/>
-                  <a:pt x="287892" y="-4966"/>
-                  <a:pt x="434157" y="0"/>
-                </a:cubicBezTo>
-                <a:cubicBezTo>
-                  <a:pt x="580422" y="4966"/>
-                  <a:pt x="943595" y="-14182"/>
-                  <a:pt x="1193932" y="0"/>
-                </a:cubicBezTo>
-                <a:cubicBezTo>
-                  <a:pt x="1444270" y="14182"/>
-                  <a:pt x="1472129" y="5523"/>
-                  <a:pt x="1628089" y="0"/>
-                </a:cubicBezTo>
-                <a:cubicBezTo>
-                  <a:pt x="1784049" y="-5523"/>
-                  <a:pt x="1962419" y="-17322"/>
-                  <a:pt x="2225055" y="0"/>
-                </a:cubicBezTo>
-                <a:cubicBezTo>
-                  <a:pt x="2487691" y="17322"/>
-                  <a:pt x="2700681" y="1311"/>
-                  <a:pt x="3066235" y="0"/>
-                </a:cubicBezTo>
-                <a:cubicBezTo>
-                  <a:pt x="3431789" y="-1311"/>
-                  <a:pt x="3405662" y="25081"/>
-                  <a:pt x="3744605" y="0"/>
-                </a:cubicBezTo>
-                <a:cubicBezTo>
-                  <a:pt x="4083548" y="-25081"/>
-                  <a:pt x="4265111" y="-11945"/>
-                  <a:pt x="4504380" y="0"/>
-                </a:cubicBezTo>
-                <a:cubicBezTo>
-                  <a:pt x="4743649" y="11945"/>
-                  <a:pt x="4860394" y="-2832"/>
-                  <a:pt x="5101346" y="0"/>
-                </a:cubicBezTo>
-                <a:cubicBezTo>
-                  <a:pt x="5342298" y="2832"/>
-                  <a:pt x="5456387" y="23676"/>
-                  <a:pt x="5779717" y="0"/>
-                </a:cubicBezTo>
-                <a:cubicBezTo>
-                  <a:pt x="6103047" y="-23676"/>
-                  <a:pt x="6270379" y="-37291"/>
-                  <a:pt x="6620896" y="0"/>
-                </a:cubicBezTo>
-                <a:cubicBezTo>
-                  <a:pt x="6971413" y="37291"/>
-                  <a:pt x="6989068" y="24674"/>
-                  <a:pt x="7136458" y="0"/>
-                </a:cubicBezTo>
-                <a:cubicBezTo>
-                  <a:pt x="7283848" y="-24674"/>
-                  <a:pt x="7752532" y="-22436"/>
-                  <a:pt x="8140446" y="0"/>
-                </a:cubicBezTo>
-                <a:cubicBezTo>
-                  <a:pt x="8140314" y="7702"/>
-                  <a:pt x="8140234" y="13511"/>
-                  <a:pt x="8140446" y="18288"/>
-                </a:cubicBezTo>
-                <a:cubicBezTo>
-                  <a:pt x="7906329" y="-3043"/>
-                  <a:pt x="7681180" y="27465"/>
-                  <a:pt x="7543480" y="18288"/>
-                </a:cubicBezTo>
-                <a:cubicBezTo>
-                  <a:pt x="7405780" y="9111"/>
-                  <a:pt x="7216607" y="3660"/>
-                  <a:pt x="7109323" y="18288"/>
-                </a:cubicBezTo>
-                <a:cubicBezTo>
-                  <a:pt x="7002039" y="32916"/>
-                  <a:pt x="6576231" y="42692"/>
-                  <a:pt x="6430952" y="18288"/>
-                </a:cubicBezTo>
-                <a:cubicBezTo>
-                  <a:pt x="6285673" y="-6116"/>
-                  <a:pt x="6138840" y="34521"/>
-                  <a:pt x="5915391" y="18288"/>
-                </a:cubicBezTo>
-                <a:cubicBezTo>
-                  <a:pt x="5691942" y="2055"/>
-                  <a:pt x="5459460" y="51666"/>
-                  <a:pt x="5237020" y="18288"/>
-                </a:cubicBezTo>
-                <a:cubicBezTo>
-                  <a:pt x="5014580" y="-15090"/>
-                  <a:pt x="4747677" y="40449"/>
-                  <a:pt x="4558650" y="18288"/>
-                </a:cubicBezTo>
-                <a:cubicBezTo>
-                  <a:pt x="4369623" y="-3873"/>
-                  <a:pt x="4146061" y="12568"/>
-                  <a:pt x="3880279" y="18288"/>
-                </a:cubicBezTo>
-                <a:cubicBezTo>
-                  <a:pt x="3614497" y="24008"/>
-                  <a:pt x="3473808" y="-12908"/>
-                  <a:pt x="3201909" y="18288"/>
-                </a:cubicBezTo>
-                <a:cubicBezTo>
-                  <a:pt x="2930010" y="49484"/>
-                  <a:pt x="2728175" y="-3430"/>
-                  <a:pt x="2604943" y="18288"/>
-                </a:cubicBezTo>
-                <a:cubicBezTo>
-                  <a:pt x="2481711" y="40006"/>
-                  <a:pt x="2004334" y="26952"/>
-                  <a:pt x="1845168" y="18288"/>
-                </a:cubicBezTo>
-                <a:cubicBezTo>
-                  <a:pt x="1686003" y="9624"/>
-                  <a:pt x="1375070" y="37580"/>
-                  <a:pt x="1166797" y="18288"/>
-                </a:cubicBezTo>
-                <a:cubicBezTo>
-                  <a:pt x="958524" y="-1004"/>
-                  <a:pt x="342846" y="8880"/>
-                  <a:pt x="0" y="18288"/>
-                </a:cubicBezTo>
-                <a:cubicBezTo>
-                  <a:pt x="129" y="13298"/>
-                  <a:pt x="-675" y="6857"/>
-                  <a:pt x="0" y="0"/>
-                </a:cubicBezTo>
-                <a:close/>
-              </a:path>
-              <a:path w="8140446" h="18288" stroke="0" extrusionOk="0">
-                <a:moveTo>
-                  <a:pt x="0" y="0"/>
-                </a:moveTo>
-                <a:cubicBezTo>
-                  <a:pt x="142435" y="-24533"/>
-                  <a:pt x="380026" y="17447"/>
-                  <a:pt x="596966" y="0"/>
-                </a:cubicBezTo>
-                <a:cubicBezTo>
-                  <a:pt x="813906" y="-17447"/>
-                  <a:pt x="830530" y="13462"/>
-                  <a:pt x="1031123" y="0"/>
-                </a:cubicBezTo>
-                <a:cubicBezTo>
-                  <a:pt x="1231716" y="-13462"/>
-                  <a:pt x="1634038" y="0"/>
-                  <a:pt x="1872303" y="0"/>
-                </a:cubicBezTo>
-                <a:cubicBezTo>
-                  <a:pt x="2110568" y="0"/>
-                  <a:pt x="2261934" y="-25727"/>
-                  <a:pt x="2469269" y="0"/>
-                </a:cubicBezTo>
-                <a:cubicBezTo>
-                  <a:pt x="2676604" y="25727"/>
-                  <a:pt x="2790440" y="16284"/>
-                  <a:pt x="3066235" y="0"/>
-                </a:cubicBezTo>
-                <a:cubicBezTo>
-                  <a:pt x="3342030" y="-16284"/>
-                  <a:pt x="3685603" y="41976"/>
-                  <a:pt x="3907414" y="0"/>
-                </a:cubicBezTo>
-                <a:cubicBezTo>
-                  <a:pt x="4129225" y="-41976"/>
-                  <a:pt x="4177416" y="-7598"/>
-                  <a:pt x="4422976" y="0"/>
-                </a:cubicBezTo>
-                <a:cubicBezTo>
-                  <a:pt x="4668536" y="7598"/>
-                  <a:pt x="5023499" y="-28058"/>
-                  <a:pt x="5264155" y="0"/>
-                </a:cubicBezTo>
-                <a:cubicBezTo>
-                  <a:pt x="5504811" y="28058"/>
-                  <a:pt x="5703675" y="13288"/>
-                  <a:pt x="6105335" y="0"/>
-                </a:cubicBezTo>
-                <a:cubicBezTo>
-                  <a:pt x="6506995" y="-13288"/>
-                  <a:pt x="6455516" y="-5124"/>
-                  <a:pt x="6783705" y="0"/>
-                </a:cubicBezTo>
-                <a:cubicBezTo>
-                  <a:pt x="7111894" y="5124"/>
-                  <a:pt x="7512856" y="10604"/>
-                  <a:pt x="8140446" y="0"/>
-                </a:cubicBezTo>
-                <a:cubicBezTo>
-                  <a:pt x="8140458" y="8833"/>
-                  <a:pt x="8140986" y="9830"/>
-                  <a:pt x="8140446" y="18288"/>
-                </a:cubicBezTo>
-                <a:cubicBezTo>
-                  <a:pt x="7959314" y="3345"/>
-                  <a:pt x="7870113" y="10437"/>
-                  <a:pt x="7706289" y="18288"/>
-                </a:cubicBezTo>
-                <a:cubicBezTo>
-                  <a:pt x="7542465" y="26139"/>
-                  <a:pt x="7157940" y="17482"/>
-                  <a:pt x="6865109" y="18288"/>
-                </a:cubicBezTo>
-                <a:cubicBezTo>
-                  <a:pt x="6572278" y="19094"/>
-                  <a:pt x="6524256" y="38051"/>
-                  <a:pt x="6349548" y="18288"/>
-                </a:cubicBezTo>
-                <a:cubicBezTo>
-                  <a:pt x="6174840" y="-1475"/>
-                  <a:pt x="5951624" y="174"/>
-                  <a:pt x="5671177" y="18288"/>
-                </a:cubicBezTo>
-                <a:cubicBezTo>
-                  <a:pt x="5390730" y="36402"/>
-                  <a:pt x="5222992" y="60058"/>
-                  <a:pt x="4829998" y="18288"/>
-                </a:cubicBezTo>
-                <a:cubicBezTo>
-                  <a:pt x="4437004" y="-23482"/>
-                  <a:pt x="4344181" y="39087"/>
-                  <a:pt x="4151627" y="18288"/>
-                </a:cubicBezTo>
-                <a:cubicBezTo>
-                  <a:pt x="3959073" y="-2511"/>
-                  <a:pt x="3886970" y="32875"/>
-                  <a:pt x="3717470" y="18288"/>
-                </a:cubicBezTo>
-                <a:cubicBezTo>
-                  <a:pt x="3547970" y="3701"/>
-                  <a:pt x="3451521" y="31872"/>
-                  <a:pt x="3201909" y="18288"/>
-                </a:cubicBezTo>
-                <a:cubicBezTo>
-                  <a:pt x="2952297" y="4704"/>
-                  <a:pt x="2543413" y="6029"/>
-                  <a:pt x="2360729" y="18288"/>
-                </a:cubicBezTo>
-                <a:cubicBezTo>
-                  <a:pt x="2178045" y="30547"/>
-                  <a:pt x="1906056" y="25847"/>
-                  <a:pt x="1682359" y="18288"/>
-                </a:cubicBezTo>
-                <a:cubicBezTo>
-                  <a:pt x="1458662" y="10730"/>
-                  <a:pt x="1330405" y="8046"/>
-                  <a:pt x="1166797" y="18288"/>
-                </a:cubicBezTo>
-                <a:cubicBezTo>
-                  <a:pt x="1003189" y="28530"/>
-                  <a:pt x="278098" y="19533"/>
-                  <a:pt x="0" y="18288"/>
-                </a:cubicBezTo>
-                <a:cubicBezTo>
-                  <a:pt x="74" y="14054"/>
-                  <a:pt x="-46" y="6997"/>
-                  <a:pt x="0" y="0"/>
-                </a:cubicBezTo>
-                <a:close/>
-              </a:path>
-            </a:pathLst>
-          </a:custGeom>
-          <a:solidFill>
-            <a:schemeClr val="accent2"/>
-          </a:solidFill>
-          <a:ln w="41275" cap="rnd">
-            <a:solidFill>
-              <a:schemeClr val="accent2"/>
-            </a:solidFill>
-            <a:round/>
-            <a:extLst>
-              <a:ext uri="{C807C97D-BFC1-408E-A445-0C87EB9F89A2}">
-                <ask:lineSketchStyleProps xmlns:ask="http://schemas.microsoft.com/office/drawing/2018/sketchyshapes" sd="1219033472">
-                  <a:prstGeom prst="rect">
-                    <a:avLst/>
-                  </a:prstGeom>
-                  <ask:type>
-                    <ask:lineSketchFreehand/>
-                  </ask:type>
-                </ask:lineSketchStyleProps>
-              </a:ext>
-            </a:extLst>
-          </a:ln>
-        </p:spPr>
-        <p:style>
-          <a:lnRef idx="2">
-            <a:schemeClr val="accent1">
-              <a:shade val="50000"/>
-            </a:schemeClr>
-          </a:lnRef>
-          <a:fillRef idx="1">
-            <a:schemeClr val="accent1"/>
-          </a:fillRef>
-          <a:effectRef idx="0">
-            <a:schemeClr val="accent1"/>
-          </a:effectRef>
-          <a:fontRef idx="minor">
-            <a:schemeClr val="lt1"/>
-          </a:fontRef>
-        </p:style>
-        <p:txBody>
-          <a:bodyPr rtlCol="0" anchor="ctr"/>
-          <a:lstStyle/>
-          <a:p>
-            <a:pPr algn="ctr"/>
-            <a:endParaRPr lang="en-US"/>
-          </a:p>
-        </p:txBody>
-      </p:sp>
-      <p:sp>
-        <p:nvSpPr>
-          <p:cNvPr id="4" name="Rectangle 1">
-            <a:extLst>
-              <a:ext uri="{FF2B5EF4-FFF2-40B4-BE49-F238E27FC236}">
-                <a16:creationId xmlns:a16="http://schemas.microsoft.com/office/drawing/2014/main" id="{6921BDFA-7C17-B4A0-A9AE-72698BD95218}"/>
-              </a:ext>
-            </a:extLst>
-          </p:cNvPr>
-          <p:cNvSpPr>
-            <a:spLocks noGrp="1" noChangeArrowheads="1"/>
-          </p:cNvSpPr>
-          <p:nvPr>
-            <p:ph idx="1"/>
-          </p:nvPr>
-        </p:nvSpPr>
-        <p:spPr bwMode="auto">
-          <a:xfrm>
-            <a:off x="628650" y="1929384"/>
-            <a:ext cx="7886700" cy="4251960"/>
-          </a:xfrm>
-          <a:prstGeom prst="rect">
-            <a:avLst/>
-          </a:prstGeom>
-          <a:extLst>
-            <a:ext uri="{909E8E84-426E-40DD-AFC4-6F175D3DCCD1}">
-              <a14:hiddenFill xmlns:a14="http://schemas.microsoft.com/office/drawing/2010/main">
-                <a:solidFill>
-                  <a:schemeClr val="accent1"/>
-                </a:solidFill>
-              </a14:hiddenFill>
-            </a:ext>
-            <a:ext uri="{91240B29-F687-4F45-9708-019B960494DF}">
-              <a14:hiddenLine xmlns:a14="http://schemas.microsoft.com/office/drawing/2010/main" w="9525">
-                <a:solidFill>
-                  <a:schemeClr val="tx1"/>
-                </a:solidFill>
-                <a:miter lim="800000"/>
-                <a:headEnd/>
-                <a:tailEnd/>
-              </a14:hiddenLine>
-            </a:ext>
-            <a:ext uri="{AF507438-7753-43E0-B8FC-AC1667EBCBE1}">
-              <a14:hiddenEffects xmlns:a14="http://schemas.microsoft.com/office/drawing/2010/main">
-                <a:effectLst>
-                  <a:outerShdw dist="35921" dir="2700000" algn="ctr" rotWithShape="0">
-                    <a:schemeClr val="bg2"/>
-                  </a:outerShdw>
-                </a:effectLst>
-              </a14:hiddenEffects>
-            </a:ext>
-          </a:extLst>
-        </p:spPr>
-        <p:txBody>
-          <a:bodyPr vert="horz" lIns="91440" tIns="45720" rIns="91440" bIns="45720" numCol="1" anchorCtr="0" compatLnSpc="1">
-            <a:prstTxWarp prst="textNoShape">
-              <a:avLst/>
-            </a:prstTxWarp>
-            <a:normAutofit/>
-          </a:bodyPr>
-          <a:lstStyle/>
-          <a:p>
-            <a:pPr marL="0" marR="0" lvl="0" indent="0" defTabSz="914400" rtl="0" eaLnBrk="0" fontAlgn="base" latinLnBrk="0" hangingPunct="0">
-              <a:lnSpc>
-                <a:spcPct val="150000"/>
-              </a:lnSpc>
-              <a:spcBef>
-                <a:spcPct val="0"/>
-              </a:spcBef>
-              <a:spcAft>
-                <a:spcPts val="600"/>
-              </a:spcAft>
-              <a:buClrTx/>
-              <a:buSzTx/>
-              <a:buFontTx/>
-              <a:buChar char="•"/>
-              <a:tabLst/>
-            </a:pPr>
-            <a:r>
-              <a:rPr kumimoji="0" lang="hu-HU" altLang="en-US" sz="2400" b="0" i="0" u="none" strike="noStrike" cap="none" normalizeH="0" baseline="0" dirty="0">
-                <a:ln>
-                  <a:noFill/>
-                </a:ln>
-                <a:effectLst/>
-                <a:latin typeface="Arial" panose="020B0604020202020204" pitchFamily="34" charset="0"/>
-              </a:rPr>
-              <a:t> </a:t>
-            </a:r>
-            <a:r>
-              <a:rPr kumimoji="0" lang="en-US" altLang="en-US" sz="2400" b="0" i="0" u="none" strike="noStrike" cap="none" normalizeH="0" baseline="0" dirty="0" err="1">
-                <a:ln>
-                  <a:noFill/>
-                </a:ln>
-                <a:effectLst/>
-                <a:latin typeface="Arial" panose="020B0604020202020204" pitchFamily="34" charset="0"/>
-              </a:rPr>
-              <a:t>Olvasási</a:t>
-            </a:r>
-            <a:r>
-              <a:rPr kumimoji="0" lang="en-US" altLang="en-US" sz="2400" b="0" i="0" u="none" strike="noStrike" cap="none" normalizeH="0" baseline="0" dirty="0">
-                <a:ln>
-                  <a:noFill/>
-                </a:ln>
-                <a:effectLst/>
-                <a:latin typeface="Arial" panose="020B0604020202020204" pitchFamily="34" charset="0"/>
-              </a:rPr>
-              <a:t> </a:t>
-            </a:r>
-            <a:r>
-              <a:rPr kumimoji="0" lang="en-US" altLang="en-US" sz="2400" b="0" i="0" u="none" strike="noStrike" cap="none" normalizeH="0" baseline="0" dirty="0" err="1">
-                <a:ln>
-                  <a:noFill/>
-                </a:ln>
-                <a:effectLst/>
-                <a:latin typeface="Arial" panose="020B0604020202020204" pitchFamily="34" charset="0"/>
-              </a:rPr>
-              <a:t>művelet</a:t>
-            </a:r>
-            <a:r>
-              <a:rPr kumimoji="0" lang="hu-HU" altLang="en-US" sz="2400" b="0" i="0" u="none" strike="noStrike" cap="none" normalizeH="0" baseline="0" dirty="0">
-                <a:ln>
-                  <a:noFill/>
-                </a:ln>
-                <a:effectLst/>
-                <a:latin typeface="Arial" panose="020B0604020202020204" pitchFamily="34" charset="0"/>
-              </a:rPr>
-              <a:t> (lekérdezés)</a:t>
-            </a:r>
-            <a:endParaRPr kumimoji="0" lang="en-US" altLang="en-US" sz="2400" b="0" i="0" u="none" strike="noStrike" cap="none" normalizeH="0" baseline="0" dirty="0">
-              <a:ln>
-                <a:noFill/>
-              </a:ln>
-              <a:effectLst/>
-              <a:latin typeface="Arial" panose="020B0604020202020204" pitchFamily="34" charset="0"/>
-            </a:endParaRPr>
-          </a:p>
-          <a:p>
-            <a:pPr marL="0" marR="0" lvl="0" indent="0" defTabSz="914400" rtl="0" eaLnBrk="0" fontAlgn="base" latinLnBrk="0" hangingPunct="0">
-              <a:lnSpc>
-                <a:spcPct val="150000"/>
-              </a:lnSpc>
-              <a:spcBef>
-                <a:spcPct val="0"/>
-              </a:spcBef>
-              <a:spcAft>
-                <a:spcPts val="600"/>
-              </a:spcAft>
-              <a:buClrTx/>
-              <a:buSzTx/>
-              <a:buFontTx/>
-              <a:buChar char="•"/>
-              <a:tabLst/>
-            </a:pPr>
-            <a:r>
-              <a:rPr kumimoji="0" lang="hu-HU" altLang="en-US" sz="2400" b="0" i="0" u="none" strike="noStrike" cap="none" normalizeH="0" baseline="0" dirty="0">
-                <a:ln>
-                  <a:noFill/>
-                </a:ln>
-                <a:effectLst/>
-                <a:latin typeface="Arial" panose="020B0604020202020204" pitchFamily="34" charset="0"/>
-              </a:rPr>
-              <a:t> </a:t>
-            </a:r>
-            <a:r>
-              <a:rPr kumimoji="0" lang="en-US" altLang="en-US" sz="2400" b="0" i="0" u="none" strike="noStrike" cap="none" normalizeH="0" baseline="0" dirty="0" err="1">
-                <a:ln>
-                  <a:noFill/>
-                </a:ln>
-                <a:effectLst/>
-                <a:latin typeface="Arial" panose="020B0604020202020204" pitchFamily="34" charset="0"/>
-              </a:rPr>
-              <a:t>Általában</a:t>
-            </a:r>
-            <a:r>
-              <a:rPr kumimoji="0" lang="en-US" altLang="en-US" sz="2400" b="0" i="0" u="none" strike="noStrike" cap="none" normalizeH="0" baseline="0" dirty="0">
-                <a:ln>
-                  <a:noFill/>
-                </a:ln>
-                <a:effectLst/>
-                <a:latin typeface="Arial" panose="020B0604020202020204" pitchFamily="34" charset="0"/>
-              </a:rPr>
-              <a:t> </a:t>
-            </a:r>
-            <a:r>
-              <a:rPr kumimoji="0" lang="en-US" altLang="en-US" sz="2400" b="0" i="0" u="none" strike="noStrike" cap="none" normalizeH="0" baseline="0" dirty="0" err="1">
-                <a:ln>
-                  <a:noFill/>
-                </a:ln>
-                <a:effectLst/>
-                <a:latin typeface="Arial" panose="020B0604020202020204" pitchFamily="34" charset="0"/>
-              </a:rPr>
-              <a:t>nincs</a:t>
-            </a:r>
-            <a:r>
-              <a:rPr kumimoji="0" lang="en-US" altLang="en-US" sz="2400" b="0" i="0" u="none" strike="noStrike" cap="none" normalizeH="0" baseline="0" dirty="0">
-                <a:ln>
-                  <a:noFill/>
-                </a:ln>
-                <a:effectLst/>
-                <a:latin typeface="Arial" panose="020B0604020202020204" pitchFamily="34" charset="0"/>
-              </a:rPr>
-              <a:t> body</a:t>
-            </a:r>
-          </a:p>
-          <a:p>
-            <a:pPr marL="0" marR="0" lvl="0" indent="0" defTabSz="914400" rtl="0" eaLnBrk="0" fontAlgn="base" latinLnBrk="0" hangingPunct="0">
-              <a:lnSpc>
-                <a:spcPct val="150000"/>
-              </a:lnSpc>
-              <a:spcBef>
-                <a:spcPct val="0"/>
-              </a:spcBef>
-              <a:spcAft>
-                <a:spcPts val="600"/>
-              </a:spcAft>
-              <a:buClrTx/>
-              <a:buSzTx/>
-              <a:buFontTx/>
-              <a:buChar char="•"/>
-              <a:tabLst/>
-            </a:pPr>
-            <a:r>
-              <a:rPr kumimoji="0" lang="hu-HU" altLang="en-US" sz="2400" b="0" i="0" u="none" strike="noStrike" cap="none" normalizeH="0" baseline="0" dirty="0">
-                <a:ln>
-                  <a:noFill/>
-                </a:ln>
-                <a:effectLst/>
-                <a:latin typeface="Arial" panose="020B0604020202020204" pitchFamily="34" charset="0"/>
-              </a:rPr>
-              <a:t> </a:t>
-            </a:r>
-            <a:r>
-              <a:rPr kumimoji="0" lang="en-US" altLang="en-US" sz="2400" b="0" i="0" u="none" strike="noStrike" cap="none" normalizeH="0" baseline="0" dirty="0" err="1">
-                <a:ln>
-                  <a:noFill/>
-                </a:ln>
-                <a:effectLst/>
-                <a:latin typeface="Arial" panose="020B0604020202020204" pitchFamily="34" charset="0"/>
-              </a:rPr>
-              <a:t>Biztonságos</a:t>
-            </a:r>
-            <a:r>
-              <a:rPr kumimoji="0" lang="en-US" altLang="en-US" sz="2400" b="0" i="0" u="none" strike="noStrike" cap="none" normalizeH="0" baseline="0" dirty="0">
-                <a:ln>
-                  <a:noFill/>
-                </a:ln>
-                <a:effectLst/>
-                <a:latin typeface="Arial" panose="020B0604020202020204" pitchFamily="34" charset="0"/>
-              </a:rPr>
-              <a:t> (safe)</a:t>
-            </a:r>
-          </a:p>
-          <a:p>
-            <a:pPr marL="0" marR="0" lvl="0" indent="0" defTabSz="914400" rtl="0" eaLnBrk="0" fontAlgn="base" latinLnBrk="0" hangingPunct="0">
-              <a:lnSpc>
-                <a:spcPct val="150000"/>
-              </a:lnSpc>
-              <a:spcBef>
-                <a:spcPct val="0"/>
-              </a:spcBef>
-              <a:spcAft>
-                <a:spcPts val="600"/>
-              </a:spcAft>
-              <a:buClrTx/>
-              <a:buSzTx/>
-              <a:buFontTx/>
-              <a:buChar char="•"/>
-              <a:tabLst/>
-            </a:pPr>
-            <a:r>
-              <a:rPr kumimoji="0" lang="hu-HU" altLang="en-US" sz="2400" b="0" i="0" u="none" strike="noStrike" cap="none" normalizeH="0" baseline="0" dirty="0">
-                <a:ln>
-                  <a:noFill/>
-                </a:ln>
-                <a:effectLst/>
-                <a:latin typeface="Arial" panose="020B0604020202020204" pitchFamily="34" charset="0"/>
-              </a:rPr>
-              <a:t> </a:t>
-            </a:r>
-            <a:r>
-              <a:rPr kumimoji="0" lang="en-US" altLang="en-US" sz="2400" b="0" i="0" u="none" strike="noStrike" cap="none" normalizeH="0" baseline="0" dirty="0" err="1">
-                <a:ln>
-                  <a:noFill/>
-                </a:ln>
-                <a:effectLst/>
-                <a:latin typeface="Arial" panose="020B0604020202020204" pitchFamily="34" charset="0"/>
-              </a:rPr>
-              <a:t>Idempotens</a:t>
-            </a:r>
-            <a:endParaRPr kumimoji="0" lang="en-US" altLang="en-US" sz="2400" b="0" i="0" u="none" strike="noStrike" cap="none" normalizeH="0" baseline="0" dirty="0">
-              <a:ln>
-                <a:noFill/>
-              </a:ln>
-              <a:effectLst/>
-              <a:latin typeface="Arial" panose="020B0604020202020204" pitchFamily="34" charset="0"/>
-            </a:endParaRPr>
-          </a:p>
-          <a:p>
-            <a:pPr marL="0" marR="0" lvl="0" indent="0" defTabSz="914400" rtl="0" eaLnBrk="0" fontAlgn="base" latinLnBrk="0" hangingPunct="0">
-              <a:lnSpc>
-                <a:spcPct val="150000"/>
-              </a:lnSpc>
-              <a:spcBef>
-                <a:spcPct val="0"/>
-              </a:spcBef>
-              <a:spcAft>
-                <a:spcPts val="600"/>
-              </a:spcAft>
-              <a:buClrTx/>
-              <a:buSzTx/>
-              <a:buFontTx/>
-              <a:buChar char="•"/>
-              <a:tabLst/>
-            </a:pPr>
-            <a:r>
-              <a:rPr kumimoji="0" lang="hu-HU" altLang="en-US" sz="2400" b="0" i="0" u="none" strike="noStrike" cap="none" normalizeH="0" baseline="0" dirty="0">
-                <a:ln>
-                  <a:noFill/>
-                </a:ln>
-                <a:effectLst/>
-                <a:latin typeface="Arial" panose="020B0604020202020204" pitchFamily="34" charset="0"/>
-              </a:rPr>
-              <a:t> </a:t>
-            </a:r>
-            <a:r>
-              <a:rPr kumimoji="0" lang="hu-HU" altLang="en-US" sz="2400" b="0" i="0" u="none" strike="noStrike" cap="none" normalizeH="0" baseline="0" dirty="0" err="1">
-                <a:ln>
-                  <a:noFill/>
-                </a:ln>
-                <a:effectLst/>
-                <a:latin typeface="Arial" panose="020B0604020202020204" pitchFamily="34" charset="0"/>
-              </a:rPr>
-              <a:t>Gyorsítótárazható</a:t>
-            </a:r>
-            <a:r>
-              <a:rPr kumimoji="0" lang="hu-HU" altLang="en-US" sz="2400" b="0" i="0" u="none" strike="noStrike" cap="none" normalizeH="0" baseline="0" dirty="0">
-                <a:ln>
-                  <a:noFill/>
-                </a:ln>
-                <a:effectLst/>
-                <a:latin typeface="Arial" panose="020B0604020202020204" pitchFamily="34" charset="0"/>
-              </a:rPr>
-              <a:t> (</a:t>
-            </a:r>
-            <a:r>
-              <a:rPr kumimoji="0" lang="en-US" altLang="en-US" sz="2400" b="0" i="0" u="none" strike="noStrike" cap="none" normalizeH="0" baseline="0" dirty="0">
-                <a:ln>
-                  <a:noFill/>
-                </a:ln>
-                <a:effectLst/>
-                <a:latin typeface="Arial" panose="020B0604020202020204" pitchFamily="34" charset="0"/>
-              </a:rPr>
-              <a:t>Cach</a:t>
-            </a:r>
-            <a:r>
-              <a:rPr kumimoji="0" lang="hu-HU" altLang="en-US" sz="2400" b="0" i="0" u="none" strike="noStrike" cap="none" normalizeH="0" baseline="0" dirty="0">
-                <a:ln>
-                  <a:noFill/>
-                </a:ln>
-                <a:effectLst/>
-                <a:latin typeface="Arial" panose="020B0604020202020204" pitchFamily="34" charset="0"/>
-              </a:rPr>
-              <a:t>ing)</a:t>
-            </a:r>
-          </a:p>
-          <a:p>
-            <a:pPr marL="0" lvl="0" indent="0" defTabSz="914400" eaLnBrk="0" fontAlgn="base" hangingPunct="0">
-              <a:lnSpc>
-                <a:spcPct val="150000"/>
-              </a:lnSpc>
-              <a:spcBef>
-                <a:spcPct val="0"/>
-              </a:spcBef>
-              <a:spcAft>
-                <a:spcPts val="600"/>
-              </a:spcAft>
-              <a:buFontTx/>
-              <a:buChar char="•"/>
-            </a:pPr>
-            <a:r>
-              <a:rPr lang="hu-HU" sz="2400" dirty="0"/>
-              <a:t> </a:t>
-            </a:r>
-            <a:r>
-              <a:rPr lang="en-US" sz="2400" dirty="0"/>
-              <a:t>URL query </a:t>
-            </a:r>
-            <a:r>
-              <a:rPr lang="en-US" sz="2400" dirty="0" err="1"/>
-              <a:t>paramétereket</a:t>
-            </a:r>
-            <a:r>
-              <a:rPr lang="en-US" sz="2400" dirty="0"/>
-              <a:t> </a:t>
-            </a:r>
-            <a:r>
-              <a:rPr lang="en-US" sz="2400" dirty="0" err="1"/>
-              <a:t>használ</a:t>
-            </a:r>
-            <a:r>
-              <a:rPr lang="hu-HU" sz="2400" dirty="0"/>
-              <a:t>hat</a:t>
             </a:r>
             <a:endParaRPr kumimoji="0" lang="en-US" altLang="en-US" sz="2400" b="0" i="0" u="none" strike="noStrike" cap="none" normalizeH="0" baseline="0" dirty="0">
               <a:ln>

</xml_diff>